<commit_message>
update requirements, add reqs
</commit_message>
<xml_diff>
--- a/Reqs.pptx
+++ b/Reqs.pptx
@@ -5596,7 +5596,21 @@
       </dgm:t>
     </dgm:pt>
     <dgm:pt modelId="{FC68D89F-F60C-4647-B6F9-906AFDF65E2F}">
-      <dgm:prSet phldrT="[Text]" phldr="1"/>
+      <dgm:prSet phldrT="[Text]"/>
+      <dgm:spPr/>
+      <dgm:t>
+        <a:bodyPr/>
+        <a:lstStyle/>
+        <a:p>
+          <a:r>
+            <a:rPr lang="en-GB" dirty="0"/>
+            <a:t>First Name</a:t>
+          </a:r>
+        </a:p>
+      </dgm:t>
+    </dgm:pt>
+    <dgm:pt modelId="{A7D411E4-AB4C-44B8-96A1-3027D1C4ED89}" type="parTrans" cxnId="{1D762780-4625-48E5-92AD-9D2E485CA42F}">
+      <dgm:prSet/>
       <dgm:spPr/>
       <dgm:t>
         <a:bodyPr/>
@@ -5606,7 +5620,7 @@
         </a:p>
       </dgm:t>
     </dgm:pt>
-    <dgm:pt modelId="{A7D411E4-AB4C-44B8-96A1-3027D1C4ED89}" type="parTrans" cxnId="{1D762780-4625-48E5-92AD-9D2E485CA42F}">
+    <dgm:pt modelId="{08EC7BD6-CC72-4A52-AB2C-376821A3672B}" type="sibTrans" cxnId="{1D762780-4625-48E5-92AD-9D2E485CA42F}">
       <dgm:prSet/>
       <dgm:spPr/>
       <dgm:t>
@@ -5617,25 +5631,17 @@
         </a:p>
       </dgm:t>
     </dgm:pt>
-    <dgm:pt modelId="{08EC7BD6-CC72-4A52-AB2C-376821A3672B}" type="sibTrans" cxnId="{1D762780-4625-48E5-92AD-9D2E485CA42F}">
-      <dgm:prSet/>
+    <dgm:pt modelId="{87A6A348-6BD7-4A0D-B9A3-B51FE2819956}">
+      <dgm:prSet phldrT="[Text]"/>
       <dgm:spPr/>
       <dgm:t>
         <a:bodyPr/>
         <a:lstStyle/>
         <a:p>
-          <a:endParaRPr lang="en-GB"/>
-        </a:p>
-      </dgm:t>
-    </dgm:pt>
-    <dgm:pt modelId="{87A6A348-6BD7-4A0D-B9A3-B51FE2819956}">
-      <dgm:prSet phldrT="[Text]" phldr="1"/>
-      <dgm:spPr/>
-      <dgm:t>
-        <a:bodyPr/>
-        <a:lstStyle/>
-        <a:p>
-          <a:endParaRPr lang="en-GB"/>
+          <a:r>
+            <a:rPr lang="en-GB" dirty="0"/>
+            <a:t>Last Name</a:t>
+          </a:r>
         </a:p>
       </dgm:t>
     </dgm:pt>
@@ -5698,7 +5704,21 @@
       </dgm:t>
     </dgm:pt>
     <dgm:pt modelId="{FA5C6EAE-9881-4B7A-B2C9-31BF0B008231}">
-      <dgm:prSet phldrT="[Text]" phldr="1"/>
+      <dgm:prSet phldrT="[Text]"/>
+      <dgm:spPr/>
+      <dgm:t>
+        <a:bodyPr/>
+        <a:lstStyle/>
+        <a:p>
+          <a:r>
+            <a:rPr lang="en-GB" dirty="0"/>
+            <a:t>First Name</a:t>
+          </a:r>
+        </a:p>
+      </dgm:t>
+    </dgm:pt>
+    <dgm:pt modelId="{6C53873B-8024-4ECC-8F84-5E5FC2A18D7F}" type="parTrans" cxnId="{3345B0DB-6D1F-42BF-8F23-257ED410970D}">
+      <dgm:prSet/>
       <dgm:spPr/>
       <dgm:t>
         <a:bodyPr/>
@@ -5708,7 +5728,7 @@
         </a:p>
       </dgm:t>
     </dgm:pt>
-    <dgm:pt modelId="{6C53873B-8024-4ECC-8F84-5E5FC2A18D7F}" type="parTrans" cxnId="{3345B0DB-6D1F-42BF-8F23-257ED410970D}">
+    <dgm:pt modelId="{77F68DCC-0434-4E37-A897-F9DA5A735893}" type="sibTrans" cxnId="{3345B0DB-6D1F-42BF-8F23-257ED410970D}">
       <dgm:prSet/>
       <dgm:spPr/>
       <dgm:t>
@@ -5719,25 +5739,14 @@
         </a:p>
       </dgm:t>
     </dgm:pt>
-    <dgm:pt modelId="{77F68DCC-0434-4E37-A897-F9DA5A735893}" type="sibTrans" cxnId="{3345B0DB-6D1F-42BF-8F23-257ED410970D}">
-      <dgm:prSet/>
+    <dgm:pt modelId="{52BA6D45-9B24-4CE1-8F9F-CB685403CFDA}">
+      <dgm:prSet phldrT="[Text]" phldr="1"/>
       <dgm:spPr/>
       <dgm:t>
         <a:bodyPr/>
         <a:lstStyle/>
         <a:p>
-          <a:endParaRPr lang="en-GB"/>
-        </a:p>
-      </dgm:t>
-    </dgm:pt>
-    <dgm:pt modelId="{52BA6D45-9B24-4CE1-8F9F-CB685403CFDA}">
-      <dgm:prSet phldrT="[Text]" phldr="1"/>
-      <dgm:spPr/>
-      <dgm:t>
-        <a:bodyPr/>
-        <a:lstStyle/>
-        <a:p>
-          <a:endParaRPr lang="en-GB"/>
+          <a:endParaRPr lang="en-GB" dirty="0"/>
         </a:p>
       </dgm:t>
     </dgm:pt>
@@ -5800,7 +5809,21 @@
       </dgm:t>
     </dgm:pt>
     <dgm:pt modelId="{F2FDF98F-70DD-43F3-A937-79607D32FF73}">
-      <dgm:prSet phldrT="[Text]" phldr="1"/>
+      <dgm:prSet phldrT="[Text]"/>
+      <dgm:spPr/>
+      <dgm:t>
+        <a:bodyPr/>
+        <a:lstStyle/>
+        <a:p>
+          <a:r>
+            <a:rPr lang="en-GB" dirty="0"/>
+            <a:t>First Name</a:t>
+          </a:r>
+        </a:p>
+      </dgm:t>
+    </dgm:pt>
+    <dgm:pt modelId="{CAF1C282-2B7F-4262-8E2F-F6BD78135C70}" type="parTrans" cxnId="{CE1154CB-6E19-4DD3-913B-955A8A87DFF3}">
+      <dgm:prSet/>
       <dgm:spPr/>
       <dgm:t>
         <a:bodyPr/>
@@ -5810,7 +5833,7 @@
         </a:p>
       </dgm:t>
     </dgm:pt>
-    <dgm:pt modelId="{CAF1C282-2B7F-4262-8E2F-F6BD78135C70}" type="parTrans" cxnId="{CE1154CB-6E19-4DD3-913B-955A8A87DFF3}">
+    <dgm:pt modelId="{3A311996-AA89-4476-A8B3-95DAF47393A7}" type="sibTrans" cxnId="{CE1154CB-6E19-4DD3-913B-955A8A87DFF3}">
       <dgm:prSet/>
       <dgm:spPr/>
       <dgm:t>
@@ -5821,7 +5844,18 @@
         </a:p>
       </dgm:t>
     </dgm:pt>
-    <dgm:pt modelId="{3A311996-AA89-4476-A8B3-95DAF47393A7}" type="sibTrans" cxnId="{CE1154CB-6E19-4DD3-913B-955A8A87DFF3}">
+    <dgm:pt modelId="{7BB3457D-B4A3-41C3-A2D5-BA916C548AB9}">
+      <dgm:prSet phldrT="[Text]" phldr="1"/>
+      <dgm:spPr/>
+      <dgm:t>
+        <a:bodyPr/>
+        <a:lstStyle/>
+        <a:p>
+          <a:endParaRPr lang="en-GB" dirty="0"/>
+        </a:p>
+      </dgm:t>
+    </dgm:pt>
+    <dgm:pt modelId="{E884D1AD-4342-4A4E-B342-54C7D25A5CAE}" type="parTrans" cxnId="{E5121F72-661E-413F-8567-F13BA5C064F9}">
       <dgm:prSet/>
       <dgm:spPr/>
       <dgm:t>
@@ -5832,8 +5866,8 @@
         </a:p>
       </dgm:t>
     </dgm:pt>
-    <dgm:pt modelId="{7BB3457D-B4A3-41C3-A2D5-BA916C548AB9}">
-      <dgm:prSet phldrT="[Text]" phldr="1"/>
+    <dgm:pt modelId="{2111A4DF-7035-47D4-81C9-2CEFD745D3AB}" type="sibTrans" cxnId="{E5121F72-661E-413F-8567-F13BA5C064F9}">
+      <dgm:prSet/>
       <dgm:spPr/>
       <dgm:t>
         <a:bodyPr/>
@@ -5843,7 +5877,88 @@
         </a:p>
       </dgm:t>
     </dgm:pt>
-    <dgm:pt modelId="{E884D1AD-4342-4A4E-B342-54C7D25A5CAE}" type="parTrans" cxnId="{E5121F72-661E-413F-8567-F13BA5C064F9}">
+    <dgm:pt modelId="{EA5BA009-40A0-4498-A683-8BF0B329EA4C}">
+      <dgm:prSet phldrT="[Text]"/>
+      <dgm:spPr/>
+      <dgm:t>
+        <a:bodyPr/>
+        <a:lstStyle/>
+        <a:p>
+          <a:r>
+            <a:rPr lang="en-GB" dirty="0"/>
+            <a:t>Email</a:t>
+          </a:r>
+        </a:p>
+      </dgm:t>
+    </dgm:pt>
+    <dgm:pt modelId="{61C5A039-220D-4BBC-8762-63EC4D3C038C}" type="parTrans" cxnId="{3EF15728-8D37-43A6-A2BA-2CF68DE07DBA}">
+      <dgm:prSet/>
+      <dgm:spPr/>
+    </dgm:pt>
+    <dgm:pt modelId="{572C1486-0853-423A-ABA7-A094B9A11371}" type="sibTrans" cxnId="{3EF15728-8D37-43A6-A2BA-2CF68DE07DBA}">
+      <dgm:prSet/>
+      <dgm:spPr/>
+    </dgm:pt>
+    <dgm:pt modelId="{967EFD47-197B-4577-AAC3-35DD26117B36}">
+      <dgm:prSet phldrT="[Text]"/>
+      <dgm:spPr/>
+      <dgm:t>
+        <a:bodyPr/>
+        <a:lstStyle/>
+        <a:p>
+          <a:r>
+            <a:rPr lang="en-GB" dirty="0"/>
+            <a:t>Password</a:t>
+          </a:r>
+        </a:p>
+      </dgm:t>
+    </dgm:pt>
+    <dgm:pt modelId="{68D62C6D-70F9-43DF-9F58-BF3A3B4BC0C6}" type="parTrans" cxnId="{99D38445-9CB2-4828-A446-6A4BF00CCD4D}">
+      <dgm:prSet/>
+      <dgm:spPr/>
+    </dgm:pt>
+    <dgm:pt modelId="{85271968-B736-4510-B1B2-0C934F7C14FF}" type="sibTrans" cxnId="{99D38445-9CB2-4828-A446-6A4BF00CCD4D}">
+      <dgm:prSet/>
+      <dgm:spPr/>
+    </dgm:pt>
+    <dgm:pt modelId="{C72E0B00-FCCF-4068-9417-3543BC3D0BE0}">
+      <dgm:prSet phldrT="[Text]"/>
+      <dgm:spPr/>
+      <dgm:t>
+        <a:bodyPr/>
+        <a:lstStyle/>
+        <a:p>
+          <a:r>
+            <a:rPr lang="en-GB" dirty="0"/>
+            <a:t>Is staff</a:t>
+          </a:r>
+        </a:p>
+      </dgm:t>
+    </dgm:pt>
+    <dgm:pt modelId="{CC738099-EA19-4EDA-9815-824FDC661ACA}" type="parTrans" cxnId="{D18F77A0-2F98-43BB-B9E4-9A8BCF80A3CB}">
+      <dgm:prSet/>
+      <dgm:spPr/>
+    </dgm:pt>
+    <dgm:pt modelId="{6428DA89-02F1-45C0-8241-69D5F9CAF8C3}" type="sibTrans" cxnId="{D18F77A0-2F98-43BB-B9E4-9A8BCF80A3CB}">
+      <dgm:prSet/>
+      <dgm:spPr/>
+    </dgm:pt>
+    <dgm:pt modelId="{7BB1C75D-FD04-4A16-AB30-64B2A0BDD377}">
+      <dgm:prSet/>
+      <dgm:spPr/>
+      <dgm:t>
+        <a:bodyPr/>
+        <a:lstStyle/>
+        <a:p>
+          <a:r>
+            <a:rPr lang="en-GB"/>
+            <a:t>Last Name</a:t>
+          </a:r>
+          <a:endParaRPr lang="en-GB" dirty="0"/>
+        </a:p>
+      </dgm:t>
+    </dgm:pt>
+    <dgm:pt modelId="{439EF2EF-9D54-4423-B528-F61CCC888BA7}" type="parTrans" cxnId="{6E907C9C-1B5D-447E-A980-6086E9B2ED88}">
       <dgm:prSet/>
       <dgm:spPr/>
       <dgm:t>
@@ -5854,7 +5969,266 @@
         </a:p>
       </dgm:t>
     </dgm:pt>
-    <dgm:pt modelId="{2111A4DF-7035-47D4-81C9-2CEFD745D3AB}" type="sibTrans" cxnId="{E5121F72-661E-413F-8567-F13BA5C064F9}">
+    <dgm:pt modelId="{BF1743C3-56EF-4E06-97E4-F87E1DD4D8EC}" type="sibTrans" cxnId="{6E907C9C-1B5D-447E-A980-6086E9B2ED88}">
+      <dgm:prSet/>
+      <dgm:spPr/>
+      <dgm:t>
+        <a:bodyPr/>
+        <a:lstStyle/>
+        <a:p>
+          <a:endParaRPr lang="en-GB"/>
+        </a:p>
+      </dgm:t>
+    </dgm:pt>
+    <dgm:pt modelId="{044D7A21-C5DD-42E1-819B-93B018518A17}">
+      <dgm:prSet/>
+      <dgm:spPr/>
+      <dgm:t>
+        <a:bodyPr/>
+        <a:lstStyle/>
+        <a:p>
+          <a:r>
+            <a:rPr lang="en-GB"/>
+            <a:t>Email</a:t>
+          </a:r>
+          <a:endParaRPr lang="en-GB" dirty="0"/>
+        </a:p>
+      </dgm:t>
+    </dgm:pt>
+    <dgm:pt modelId="{B1E58405-39E5-48FC-91BB-5DEC14D2E655}" type="parTrans" cxnId="{37F30611-AB5E-4A95-9962-D0F8360C47F5}">
+      <dgm:prSet/>
+      <dgm:spPr/>
+      <dgm:t>
+        <a:bodyPr/>
+        <a:lstStyle/>
+        <a:p>
+          <a:endParaRPr lang="en-GB"/>
+        </a:p>
+      </dgm:t>
+    </dgm:pt>
+    <dgm:pt modelId="{41DA7849-4AC8-4C47-8D14-A8BB180F33A3}" type="sibTrans" cxnId="{37F30611-AB5E-4A95-9962-D0F8360C47F5}">
+      <dgm:prSet/>
+      <dgm:spPr/>
+      <dgm:t>
+        <a:bodyPr/>
+        <a:lstStyle/>
+        <a:p>
+          <a:endParaRPr lang="en-GB"/>
+        </a:p>
+      </dgm:t>
+    </dgm:pt>
+    <dgm:pt modelId="{4D85D399-42FF-4153-936A-7B8CCDD332C3}">
+      <dgm:prSet/>
+      <dgm:spPr/>
+      <dgm:t>
+        <a:bodyPr/>
+        <a:lstStyle/>
+        <a:p>
+          <a:r>
+            <a:rPr lang="en-GB"/>
+            <a:t>Password</a:t>
+          </a:r>
+          <a:endParaRPr lang="en-GB" dirty="0"/>
+        </a:p>
+      </dgm:t>
+    </dgm:pt>
+    <dgm:pt modelId="{A4AE7189-5D3D-4D82-91B2-62CCEC34E774}" type="parTrans" cxnId="{B27439DE-C64F-48E3-982D-70C281FBA858}">
+      <dgm:prSet/>
+      <dgm:spPr/>
+      <dgm:t>
+        <a:bodyPr/>
+        <a:lstStyle/>
+        <a:p>
+          <a:endParaRPr lang="en-GB"/>
+        </a:p>
+      </dgm:t>
+    </dgm:pt>
+    <dgm:pt modelId="{1493E739-E2C5-470B-B443-BED5A9944E5F}" type="sibTrans" cxnId="{B27439DE-C64F-48E3-982D-70C281FBA858}">
+      <dgm:prSet/>
+      <dgm:spPr/>
+      <dgm:t>
+        <a:bodyPr/>
+        <a:lstStyle/>
+        <a:p>
+          <a:endParaRPr lang="en-GB"/>
+        </a:p>
+      </dgm:t>
+    </dgm:pt>
+    <dgm:pt modelId="{5BE2FC6F-F276-496D-826B-6F19E433EF96}">
+      <dgm:prSet/>
+      <dgm:spPr/>
+      <dgm:t>
+        <a:bodyPr/>
+        <a:lstStyle/>
+        <a:p>
+          <a:r>
+            <a:rPr lang="en-GB" dirty="0" err="1"/>
+            <a:t>Is_academic</a:t>
+          </a:r>
+          <a:endParaRPr lang="en-GB" dirty="0"/>
+        </a:p>
+      </dgm:t>
+    </dgm:pt>
+    <dgm:pt modelId="{82F843BF-C457-4FAA-BC88-5FCB4B74B9E0}" type="parTrans" cxnId="{37919885-0E1B-417F-95BC-715AFBCE96F0}">
+      <dgm:prSet/>
+      <dgm:spPr/>
+      <dgm:t>
+        <a:bodyPr/>
+        <a:lstStyle/>
+        <a:p>
+          <a:endParaRPr lang="en-GB"/>
+        </a:p>
+      </dgm:t>
+    </dgm:pt>
+    <dgm:pt modelId="{492A358F-638B-411B-A82E-102BEDE9C67B}" type="sibTrans" cxnId="{37919885-0E1B-417F-95BC-715AFBCE96F0}">
+      <dgm:prSet/>
+      <dgm:spPr/>
+      <dgm:t>
+        <a:bodyPr/>
+        <a:lstStyle/>
+        <a:p>
+          <a:endParaRPr lang="en-GB"/>
+        </a:p>
+      </dgm:t>
+    </dgm:pt>
+    <dgm:pt modelId="{7CFBD1F0-4FC2-4656-A529-3A6F82572A34}">
+      <dgm:prSet/>
+      <dgm:spPr/>
+      <dgm:t>
+        <a:bodyPr/>
+        <a:lstStyle/>
+        <a:p>
+          <a:r>
+            <a:rPr lang="en-GB"/>
+            <a:t>Last Name</a:t>
+          </a:r>
+          <a:endParaRPr lang="en-GB" dirty="0"/>
+        </a:p>
+      </dgm:t>
+    </dgm:pt>
+    <dgm:pt modelId="{342CD77B-BC20-40B8-8775-D5C896B4B09E}" type="parTrans" cxnId="{D24F9436-0614-498C-89C9-1807B834C8C7}">
+      <dgm:prSet/>
+      <dgm:spPr/>
+      <dgm:t>
+        <a:bodyPr/>
+        <a:lstStyle/>
+        <a:p>
+          <a:endParaRPr lang="en-GB"/>
+        </a:p>
+      </dgm:t>
+    </dgm:pt>
+    <dgm:pt modelId="{2D3DE537-85C4-4341-A3CB-BE23BA471D38}" type="sibTrans" cxnId="{D24F9436-0614-498C-89C9-1807B834C8C7}">
+      <dgm:prSet/>
+      <dgm:spPr/>
+      <dgm:t>
+        <a:bodyPr/>
+        <a:lstStyle/>
+        <a:p>
+          <a:endParaRPr lang="en-GB"/>
+        </a:p>
+      </dgm:t>
+    </dgm:pt>
+    <dgm:pt modelId="{204FC57A-74D3-4E7B-9128-31629CAFFFAC}">
+      <dgm:prSet/>
+      <dgm:spPr/>
+      <dgm:t>
+        <a:bodyPr/>
+        <a:lstStyle/>
+        <a:p>
+          <a:r>
+            <a:rPr lang="en-GB"/>
+            <a:t>Email</a:t>
+          </a:r>
+          <a:endParaRPr lang="en-GB" dirty="0"/>
+        </a:p>
+      </dgm:t>
+    </dgm:pt>
+    <dgm:pt modelId="{CEBCC161-BBC6-4946-9F3B-722C66365CB0}" type="parTrans" cxnId="{8566DD26-7F90-40B6-95F8-E1886EFE5E8E}">
+      <dgm:prSet/>
+      <dgm:spPr/>
+      <dgm:t>
+        <a:bodyPr/>
+        <a:lstStyle/>
+        <a:p>
+          <a:endParaRPr lang="en-GB"/>
+        </a:p>
+      </dgm:t>
+    </dgm:pt>
+    <dgm:pt modelId="{D32EC065-702E-4F58-98FD-5FDE130A016E}" type="sibTrans" cxnId="{8566DD26-7F90-40B6-95F8-E1886EFE5E8E}">
+      <dgm:prSet/>
+      <dgm:spPr/>
+      <dgm:t>
+        <a:bodyPr/>
+        <a:lstStyle/>
+        <a:p>
+          <a:endParaRPr lang="en-GB"/>
+        </a:p>
+      </dgm:t>
+    </dgm:pt>
+    <dgm:pt modelId="{5CC975A3-C63B-4278-B5F4-F0450B0373DF}">
+      <dgm:prSet/>
+      <dgm:spPr/>
+      <dgm:t>
+        <a:bodyPr/>
+        <a:lstStyle/>
+        <a:p>
+          <a:r>
+            <a:rPr lang="en-GB"/>
+            <a:t>Password</a:t>
+          </a:r>
+          <a:endParaRPr lang="en-GB" dirty="0"/>
+        </a:p>
+      </dgm:t>
+    </dgm:pt>
+    <dgm:pt modelId="{FE4745DD-BF8B-4BB4-89B8-4507388FB87F}" type="parTrans" cxnId="{EA3AECFC-40AF-4D2C-9F72-F66E838D2DD6}">
+      <dgm:prSet/>
+      <dgm:spPr/>
+      <dgm:t>
+        <a:bodyPr/>
+        <a:lstStyle/>
+        <a:p>
+          <a:endParaRPr lang="en-GB"/>
+        </a:p>
+      </dgm:t>
+    </dgm:pt>
+    <dgm:pt modelId="{373BA41C-D3D6-4A61-88D1-EDE1879C0956}" type="sibTrans" cxnId="{EA3AECFC-40AF-4D2C-9F72-F66E838D2DD6}">
+      <dgm:prSet/>
+      <dgm:spPr/>
+      <dgm:t>
+        <a:bodyPr/>
+        <a:lstStyle/>
+        <a:p>
+          <a:endParaRPr lang="en-GB"/>
+        </a:p>
+      </dgm:t>
+    </dgm:pt>
+    <dgm:pt modelId="{60A08C7C-7B9A-47F8-BECE-F41001797542}">
+      <dgm:prSet/>
+      <dgm:spPr/>
+      <dgm:t>
+        <a:bodyPr/>
+        <a:lstStyle/>
+        <a:p>
+          <a:r>
+            <a:rPr lang="en-GB" dirty="0" err="1"/>
+            <a:t>Is_student</a:t>
+          </a:r>
+          <a:endParaRPr lang="en-GB" dirty="0"/>
+        </a:p>
+      </dgm:t>
+    </dgm:pt>
+    <dgm:pt modelId="{39C943FA-7E5D-49A4-B571-5348FA482536}" type="parTrans" cxnId="{EE5885A4-E869-413F-9F4B-102437ACF864}">
+      <dgm:prSet/>
+      <dgm:spPr/>
+      <dgm:t>
+        <a:bodyPr/>
+        <a:lstStyle/>
+        <a:p>
+          <a:endParaRPr lang="en-GB"/>
+        </a:p>
+      </dgm:t>
+    </dgm:pt>
+    <dgm:pt modelId="{4BDEECB2-DCD8-4EB4-BFD6-9E28559BF7FA}" type="sibTrans" cxnId="{EE5885A4-E869-413F-9F4B-102437ACF864}">
       <dgm:prSet/>
       <dgm:spPr/>
       <dgm:t>
@@ -5952,23 +6326,45 @@
   </dgm:ptLst>
   <dgm:cxnLst>
     <dgm:cxn modelId="{34CE7E08-408E-48F7-8228-93CE4618A34E}" type="presOf" srcId="{AEDA2EAD-BB61-49A3-9944-D4F07D68DAAE}" destId="{23B3B2DC-99F2-42CB-9E15-AF4B4733B5F9}" srcOrd="0" destOrd="0" presId="urn:microsoft.com/office/officeart/2005/8/layout/hList1"/>
+    <dgm:cxn modelId="{37F30611-AB5E-4A95-9962-D0F8360C47F5}" srcId="{236EC2F7-694E-442C-AEFC-0CA4CA578B4B}" destId="{044D7A21-C5DD-42E1-819B-93B018518A17}" srcOrd="2" destOrd="0" parTransId="{B1E58405-39E5-48FC-91BB-5DEC14D2E655}" sibTransId="{41DA7849-4AC8-4C47-8D14-A8BB180F33A3}"/>
     <dgm:cxn modelId="{DF510624-AB3C-4E38-987E-5BF8774DB398}" type="presOf" srcId="{F2FDF98F-70DD-43F3-A937-79607D32FF73}" destId="{5F4973BD-9891-4B7F-858A-40B51A75E58F}" srcOrd="0" destOrd="0" presId="urn:microsoft.com/office/officeart/2005/8/layout/hList1"/>
     <dgm:cxn modelId="{177A8825-C0A8-418D-B097-DA02AE3E742F}" type="presOf" srcId="{FC68D89F-F60C-4647-B6F9-906AFDF65E2F}" destId="{66298721-1ACF-476A-877A-BB5E732D8506}" srcOrd="0" destOrd="0" presId="urn:microsoft.com/office/officeart/2005/8/layout/hList1"/>
-    <dgm:cxn modelId="{64B43C5C-B80C-4C1B-8F12-AC387124B87E}" type="presOf" srcId="{7BB3457D-B4A3-41C3-A2D5-BA916C548AB9}" destId="{5F4973BD-9891-4B7F-858A-40B51A75E58F}" srcOrd="0" destOrd="1" presId="urn:microsoft.com/office/officeart/2005/8/layout/hList1"/>
-    <dgm:cxn modelId="{99CE925C-9509-4DCF-A69B-C4E1669A8B90}" srcId="{236EC2F7-694E-442C-AEFC-0CA4CA578B4B}" destId="{52BA6D45-9B24-4CE1-8F9F-CB685403CFDA}" srcOrd="1" destOrd="0" parTransId="{4DA2886A-E09E-4238-950C-884D166738AA}" sibTransId="{E1A4555D-CCCE-47DF-B8E1-9427F088500D}"/>
+    <dgm:cxn modelId="{09CB7126-D29B-49C5-9CE2-E1A45C7E17A8}" type="presOf" srcId="{4D85D399-42FF-4153-936A-7B8CCDD332C3}" destId="{84CFAEEA-BE16-4C92-8ADA-7F14E739DB71}" srcOrd="0" destOrd="3" presId="urn:microsoft.com/office/officeart/2005/8/layout/hList1"/>
+    <dgm:cxn modelId="{8566DD26-7F90-40B6-95F8-E1886EFE5E8E}" srcId="{CEDF3ADE-318A-4C89-B782-0CD2821E0806}" destId="{204FC57A-74D3-4E7B-9128-31629CAFFFAC}" srcOrd="2" destOrd="0" parTransId="{CEBCC161-BBC6-4946-9F3B-722C66365CB0}" sibTransId="{D32EC065-702E-4F58-98FD-5FDE130A016E}"/>
+    <dgm:cxn modelId="{3EF15728-8D37-43A6-A2BA-2CF68DE07DBA}" srcId="{C9D181AB-59E9-4ACC-84CB-6698C49A5810}" destId="{EA5BA009-40A0-4498-A683-8BF0B329EA4C}" srcOrd="2" destOrd="0" parTransId="{61C5A039-220D-4BBC-8762-63EC4D3C038C}" sibTransId="{572C1486-0853-423A-ABA7-A094B9A11371}"/>
+    <dgm:cxn modelId="{7352DE34-5995-4EC1-80D6-7CEEA135FD92}" type="presOf" srcId="{044D7A21-C5DD-42E1-819B-93B018518A17}" destId="{84CFAEEA-BE16-4C92-8ADA-7F14E739DB71}" srcOrd="0" destOrd="2" presId="urn:microsoft.com/office/officeart/2005/8/layout/hList1"/>
+    <dgm:cxn modelId="{D24F9436-0614-498C-89C9-1807B834C8C7}" srcId="{CEDF3ADE-318A-4C89-B782-0CD2821E0806}" destId="{7CFBD1F0-4FC2-4656-A529-3A6F82572A34}" srcOrd="1" destOrd="0" parTransId="{342CD77B-BC20-40B8-8775-D5C896B4B09E}" sibTransId="{2D3DE537-85C4-4341-A3CB-BE23BA471D38}"/>
+    <dgm:cxn modelId="{5EF2643B-C4B3-48CF-B582-69F681319338}" type="presOf" srcId="{60A08C7C-7B9A-47F8-BECE-F41001797542}" destId="{5F4973BD-9891-4B7F-858A-40B51A75E58F}" srcOrd="0" destOrd="4" presId="urn:microsoft.com/office/officeart/2005/8/layout/hList1"/>
+    <dgm:cxn modelId="{64B43C5C-B80C-4C1B-8F12-AC387124B87E}" type="presOf" srcId="{7BB3457D-B4A3-41C3-A2D5-BA916C548AB9}" destId="{5F4973BD-9891-4B7F-858A-40B51A75E58F}" srcOrd="0" destOrd="5" presId="urn:microsoft.com/office/officeart/2005/8/layout/hList1"/>
+    <dgm:cxn modelId="{99CE925C-9509-4DCF-A69B-C4E1669A8B90}" srcId="{236EC2F7-694E-442C-AEFC-0CA4CA578B4B}" destId="{52BA6D45-9B24-4CE1-8F9F-CB685403CFDA}" srcOrd="5" destOrd="0" parTransId="{4DA2886A-E09E-4238-950C-884D166738AA}" sibTransId="{E1A4555D-CCCE-47DF-B8E1-9427F088500D}"/>
     <dgm:cxn modelId="{8C3A8F63-87BC-4FD9-83A6-653626F75E71}" type="presOf" srcId="{CEDF3ADE-318A-4C89-B782-0CD2821E0806}" destId="{9AC2F46D-F58D-4EB8-876D-4363C9D71D81}" srcOrd="0" destOrd="0" presId="urn:microsoft.com/office/officeart/2005/8/layout/hList1"/>
-    <dgm:cxn modelId="{E5121F72-661E-413F-8567-F13BA5C064F9}" srcId="{CEDF3ADE-318A-4C89-B782-0CD2821E0806}" destId="{7BB3457D-B4A3-41C3-A2D5-BA916C548AB9}" srcOrd="1" destOrd="0" parTransId="{E884D1AD-4342-4A4E-B342-54C7D25A5CAE}" sibTransId="{2111A4DF-7035-47D4-81C9-2CEFD745D3AB}"/>
-    <dgm:cxn modelId="{B770FC58-F440-419D-A863-5C7F5DD0F262}" type="presOf" srcId="{52BA6D45-9B24-4CE1-8F9F-CB685403CFDA}" destId="{84CFAEEA-BE16-4C92-8ADA-7F14E739DB71}" srcOrd="0" destOrd="1" presId="urn:microsoft.com/office/officeart/2005/8/layout/hList1"/>
+    <dgm:cxn modelId="{99D38445-9CB2-4828-A446-6A4BF00CCD4D}" srcId="{C9D181AB-59E9-4ACC-84CB-6698C49A5810}" destId="{967EFD47-197B-4577-AAC3-35DD26117B36}" srcOrd="3" destOrd="0" parTransId="{68D62C6D-70F9-43DF-9F58-BF3A3B4BC0C6}" sibTransId="{85271968-B736-4510-B1B2-0C934F7C14FF}"/>
+    <dgm:cxn modelId="{E5121F72-661E-413F-8567-F13BA5C064F9}" srcId="{CEDF3ADE-318A-4C89-B782-0CD2821E0806}" destId="{7BB3457D-B4A3-41C3-A2D5-BA916C548AB9}" srcOrd="5" destOrd="0" parTransId="{E884D1AD-4342-4A4E-B342-54C7D25A5CAE}" sibTransId="{2111A4DF-7035-47D4-81C9-2CEFD745D3AB}"/>
+    <dgm:cxn modelId="{123CA175-BA40-42DA-A809-911C0B9A8B19}" type="presOf" srcId="{7BB1C75D-FD04-4A16-AB30-64B2A0BDD377}" destId="{84CFAEEA-BE16-4C92-8ADA-7F14E739DB71}" srcOrd="0" destOrd="1" presId="urn:microsoft.com/office/officeart/2005/8/layout/hList1"/>
+    <dgm:cxn modelId="{1DEA8C77-A88F-471D-9B05-359327C36765}" type="presOf" srcId="{5CC975A3-C63B-4278-B5F4-F0450B0373DF}" destId="{5F4973BD-9891-4B7F-858A-40B51A75E58F}" srcOrd="0" destOrd="3" presId="urn:microsoft.com/office/officeart/2005/8/layout/hList1"/>
+    <dgm:cxn modelId="{B770FC58-F440-419D-A863-5C7F5DD0F262}" type="presOf" srcId="{52BA6D45-9B24-4CE1-8F9F-CB685403CFDA}" destId="{84CFAEEA-BE16-4C92-8ADA-7F14E739DB71}" srcOrd="0" destOrd="5" presId="urn:microsoft.com/office/officeart/2005/8/layout/hList1"/>
     <dgm:cxn modelId="{1D762780-4625-48E5-92AD-9D2E485CA42F}" srcId="{C9D181AB-59E9-4ACC-84CB-6698C49A5810}" destId="{FC68D89F-F60C-4647-B6F9-906AFDF65E2F}" srcOrd="0" destOrd="0" parTransId="{A7D411E4-AB4C-44B8-96A1-3027D1C4ED89}" sibTransId="{08EC7BD6-CC72-4A52-AB2C-376821A3672B}"/>
+    <dgm:cxn modelId="{37919885-0E1B-417F-95BC-715AFBCE96F0}" srcId="{236EC2F7-694E-442C-AEFC-0CA4CA578B4B}" destId="{5BE2FC6F-F276-496D-826B-6F19E433EF96}" srcOrd="4" destOrd="0" parTransId="{82F843BF-C457-4FAA-BC88-5FCB4B74B9E0}" sibTransId="{492A358F-638B-411B-A82E-102BEDE9C67B}"/>
+    <dgm:cxn modelId="{D4E75D86-6EA9-4C17-A285-3FFC1F3BE1A8}" type="presOf" srcId="{7CFBD1F0-4FC2-4656-A529-3A6F82572A34}" destId="{5F4973BD-9891-4B7F-858A-40B51A75E58F}" srcOrd="0" destOrd="1" presId="urn:microsoft.com/office/officeart/2005/8/layout/hList1"/>
     <dgm:cxn modelId="{79596586-2E3F-45EA-AF7C-597B8B27354F}" type="presOf" srcId="{87A6A348-6BD7-4A0D-B9A3-B51FE2819956}" destId="{66298721-1ACF-476A-877A-BB5E732D8506}" srcOrd="0" destOrd="1" presId="urn:microsoft.com/office/officeart/2005/8/layout/hList1"/>
+    <dgm:cxn modelId="{52D83F9B-0D03-41ED-A483-752CE8B84887}" type="presOf" srcId="{967EFD47-197B-4577-AAC3-35DD26117B36}" destId="{66298721-1ACF-476A-877A-BB5E732D8506}" srcOrd="0" destOrd="3" presId="urn:microsoft.com/office/officeart/2005/8/layout/hList1"/>
     <dgm:cxn modelId="{6E685F9B-91D0-4944-9617-C78A8C95A049}" type="presOf" srcId="{FA5C6EAE-9881-4B7A-B2C9-31BF0B008231}" destId="{84CFAEEA-BE16-4C92-8ADA-7F14E739DB71}" srcOrd="0" destOrd="0" presId="urn:microsoft.com/office/officeart/2005/8/layout/hList1"/>
     <dgm:cxn modelId="{6E9D549C-6368-470F-B4FE-F6ED34B1CFCC}" srcId="{C9D181AB-59E9-4ACC-84CB-6698C49A5810}" destId="{87A6A348-6BD7-4A0D-B9A3-B51FE2819956}" srcOrd="1" destOrd="0" parTransId="{CF794BC3-BB7D-4D37-8181-00B99D80B97E}" sibTransId="{8F31144E-15B3-4C5B-9701-4D88AB5196DC}"/>
+    <dgm:cxn modelId="{6E907C9C-1B5D-447E-A980-6086E9B2ED88}" srcId="{236EC2F7-694E-442C-AEFC-0CA4CA578B4B}" destId="{7BB1C75D-FD04-4A16-AB30-64B2A0BDD377}" srcOrd="1" destOrd="0" parTransId="{439EF2EF-9D54-4423-B528-F61CCC888BA7}" sibTransId="{BF1743C3-56EF-4E06-97E4-F87E1DD4D8EC}"/>
+    <dgm:cxn modelId="{D18F77A0-2F98-43BB-B9E4-9A8BCF80A3CB}" srcId="{C9D181AB-59E9-4ACC-84CB-6698C49A5810}" destId="{C72E0B00-FCCF-4068-9417-3543BC3D0BE0}" srcOrd="4" destOrd="0" parTransId="{CC738099-EA19-4EDA-9815-824FDC661ACA}" sibTransId="{6428DA89-02F1-45C0-8241-69D5F9CAF8C3}"/>
+    <dgm:cxn modelId="{EE5885A4-E869-413F-9F4B-102437ACF864}" srcId="{CEDF3ADE-318A-4C89-B782-0CD2821E0806}" destId="{60A08C7C-7B9A-47F8-BECE-F41001797542}" srcOrd="4" destOrd="0" parTransId="{39C943FA-7E5D-49A4-B571-5348FA482536}" sibTransId="{4BDEECB2-DCD8-4EB4-BFD6-9E28559BF7FA}"/>
     <dgm:cxn modelId="{BCCA8FC0-BB46-4D4F-82A5-624C2EF40207}" srcId="{AEDA2EAD-BB61-49A3-9944-D4F07D68DAAE}" destId="{CEDF3ADE-318A-4C89-B782-0CD2821E0806}" srcOrd="2" destOrd="0" parTransId="{9CDDDA33-D0F3-4532-8918-B2C8CA295BBC}" sibTransId="{27A02D60-D35D-479A-84B6-68A30BA8A68D}"/>
+    <dgm:cxn modelId="{2CA47AC3-E622-4C1D-969C-861A8BD8ADC9}" type="presOf" srcId="{5BE2FC6F-F276-496D-826B-6F19E433EF96}" destId="{84CFAEEA-BE16-4C92-8ADA-7F14E739DB71}" srcOrd="0" destOrd="4" presId="urn:microsoft.com/office/officeart/2005/8/layout/hList1"/>
     <dgm:cxn modelId="{CE1154CB-6E19-4DD3-913B-955A8A87DFF3}" srcId="{CEDF3ADE-318A-4C89-B782-0CD2821E0806}" destId="{F2FDF98F-70DD-43F3-A937-79607D32FF73}" srcOrd="0" destOrd="0" parTransId="{CAF1C282-2B7F-4262-8E2F-F6BD78135C70}" sibTransId="{3A311996-AA89-4476-A8B3-95DAF47393A7}"/>
+    <dgm:cxn modelId="{101484CE-6FA6-4DA4-A5CF-524E836F4C99}" type="presOf" srcId="{204FC57A-74D3-4E7B-9128-31629CAFFFAC}" destId="{5F4973BD-9891-4B7F-858A-40B51A75E58F}" srcOrd="0" destOrd="2" presId="urn:microsoft.com/office/officeart/2005/8/layout/hList1"/>
     <dgm:cxn modelId="{872AE8D1-8C5A-4D24-8DCF-C5B2DA806D47}" srcId="{AEDA2EAD-BB61-49A3-9944-D4F07D68DAAE}" destId="{236EC2F7-694E-442C-AEFC-0CA4CA578B4B}" srcOrd="1" destOrd="0" parTransId="{D2BAEA93-617C-4BAD-979D-D987D292522D}" sibTransId="{5DFD9C5B-231C-461A-81F5-347978807394}"/>
     <dgm:cxn modelId="{3345B0DB-6D1F-42BF-8F23-257ED410970D}" srcId="{236EC2F7-694E-442C-AEFC-0CA4CA578B4B}" destId="{FA5C6EAE-9881-4B7A-B2C9-31BF0B008231}" srcOrd="0" destOrd="0" parTransId="{6C53873B-8024-4ECC-8F84-5E5FC2A18D7F}" sibTransId="{77F68DCC-0434-4E37-A897-F9DA5A735893}"/>
+    <dgm:cxn modelId="{B27439DE-C64F-48E3-982D-70C281FBA858}" srcId="{236EC2F7-694E-442C-AEFC-0CA4CA578B4B}" destId="{4D85D399-42FF-4153-936A-7B8CCDD332C3}" srcOrd="3" destOrd="0" parTransId="{A4AE7189-5D3D-4D82-91B2-62CCEC34E774}" sibTransId="{1493E739-E2C5-470B-B443-BED5A9944E5F}"/>
     <dgm:cxn modelId="{60F0E6E5-59F4-47E2-8D6B-A149207F4E71}" type="presOf" srcId="{C9D181AB-59E9-4ACC-84CB-6698C49A5810}" destId="{E034A9F9-FC51-4A14-853E-7D429BE56EDE}" srcOrd="0" destOrd="0" presId="urn:microsoft.com/office/officeart/2005/8/layout/hList1"/>
     <dgm:cxn modelId="{32CC24ED-991B-44DA-96F7-AFCB124924BD}" srcId="{AEDA2EAD-BB61-49A3-9944-D4F07D68DAAE}" destId="{C9D181AB-59E9-4ACC-84CB-6698C49A5810}" srcOrd="0" destOrd="0" parTransId="{A41265EE-8C0D-4C5A-8122-263C69360951}" sibTransId="{F73ED508-90B6-4432-9DC7-06FD39E16A21}"/>
+    <dgm:cxn modelId="{0EFA96F3-5144-4872-B030-F012AFC6CE62}" type="presOf" srcId="{C72E0B00-FCCF-4068-9417-3543BC3D0BE0}" destId="{66298721-1ACF-476A-877A-BB5E732D8506}" srcOrd="0" destOrd="4" presId="urn:microsoft.com/office/officeart/2005/8/layout/hList1"/>
+    <dgm:cxn modelId="{EA3AECFC-40AF-4D2C-9F72-F66E838D2DD6}" srcId="{CEDF3ADE-318A-4C89-B782-0CD2821E0806}" destId="{5CC975A3-C63B-4278-B5F4-F0450B0373DF}" srcOrd="3" destOrd="0" parTransId="{FE4745DD-BF8B-4BB4-89B8-4507388FB87F}" sibTransId="{373BA41C-D3D6-4A61-88D1-EDE1879C0956}"/>
+    <dgm:cxn modelId="{C17961FE-F54D-484B-A3B2-D1B79D4E77BA}" type="presOf" srcId="{EA5BA009-40A0-4498-A683-8BF0B329EA4C}" destId="{66298721-1ACF-476A-877A-BB5E732D8506}" srcOrd="0" destOrd="2" presId="urn:microsoft.com/office/officeart/2005/8/layout/hList1"/>
     <dgm:cxn modelId="{9DBDC4FE-1648-459A-83BB-F059B48BC24B}" type="presOf" srcId="{236EC2F7-694E-442C-AEFC-0CA4CA578B4B}" destId="{79B70EC0-E56A-44BA-9329-21DDC463B6E8}" srcOrd="0" destOrd="0" presId="urn:microsoft.com/office/officeart/2005/8/layout/hList1"/>
     <dgm:cxn modelId="{F244B936-766B-4755-AD7F-2775109AF0AB}" type="presParOf" srcId="{23B3B2DC-99F2-42CB-9E15-AF4B4733B5F9}" destId="{1F6BF2FD-51F2-4227-8E9C-3C33F2F97D7A}" srcOrd="0" destOrd="0" presId="urn:microsoft.com/office/officeart/2005/8/layout/hList1"/>
     <dgm:cxn modelId="{74664300-2CF2-4167-86E4-54F1A9FA7B2F}" type="presParOf" srcId="{1F6BF2FD-51F2-4227-8E9C-3C33F2F97D7A}" destId="{E034A9F9-FC51-4A14-853E-7D429BE56EDE}" srcOrd="0" destOrd="0" presId="urn:microsoft.com/office/officeart/2005/8/layout/hList1"/>
@@ -8304,8 +8700,8 @@
       </dsp:nvSpPr>
       <dsp:spPr>
         <a:xfrm>
-          <a:off x="3286" y="866709"/>
-          <a:ext cx="3203971" cy="1036800"/>
+          <a:off x="3286" y="11413"/>
+          <a:ext cx="3203971" cy="892800"/>
         </a:xfrm>
         <a:prstGeom prst="rect">
           <a:avLst/>
@@ -8347,12 +8743,12 @@
         </a:fontRef>
       </dsp:style>
       <dsp:txBody>
-        <a:bodyPr spcFirstLastPara="0" vert="horz" wrap="square" lIns="256032" tIns="146304" rIns="256032" bIns="146304" numCol="1" spcCol="1270" anchor="ctr" anchorCtr="0">
+        <a:bodyPr spcFirstLastPara="0" vert="horz" wrap="square" lIns="220472" tIns="125984" rIns="220472" bIns="125984" numCol="1" spcCol="1270" anchor="ctr" anchorCtr="0">
           <a:noAutofit/>
         </a:bodyPr>
         <a:lstStyle/>
         <a:p>
-          <a:pPr marL="0" lvl="0" indent="0" algn="ctr" defTabSz="1600200">
+          <a:pPr marL="0" lvl="0" indent="0" algn="ctr" defTabSz="1377950">
             <a:lnSpc>
               <a:spcPct val="90000"/>
             </a:lnSpc>
@@ -8365,14 +8761,14 @@
             <a:buNone/>
           </a:pPr>
           <a:r>
-            <a:rPr lang="en-GB" sz="3600" kern="1200" dirty="0"/>
+            <a:rPr lang="en-GB" sz="3100" kern="1200" dirty="0"/>
             <a:t>Staff-Admin</a:t>
           </a:r>
         </a:p>
       </dsp:txBody>
       <dsp:txXfrm>
-        <a:off x="3286" y="866709"/>
-        <a:ext cx="3203971" cy="1036800"/>
+        <a:off x="3286" y="11413"/>
+        <a:ext cx="3203971" cy="892800"/>
       </dsp:txXfrm>
     </dsp:sp>
     <dsp:sp modelId="{66298721-1ACF-476A-877A-BB5E732D8506}">
@@ -8382,8 +8778,8 @@
       </dsp:nvSpPr>
       <dsp:spPr>
         <a:xfrm>
-          <a:off x="3286" y="1903509"/>
-          <a:ext cx="3203971" cy="1581120"/>
+          <a:off x="3286" y="904213"/>
+          <a:ext cx="3203971" cy="3435710"/>
         </a:xfrm>
         <a:prstGeom prst="rect">
           <a:avLst/>
@@ -8427,12 +8823,12 @@
         <a:fontRef idx="minor"/>
       </dsp:style>
       <dsp:txBody>
-        <a:bodyPr spcFirstLastPara="0" vert="horz" wrap="square" lIns="192024" tIns="192024" rIns="256032" bIns="288036" numCol="1" spcCol="1270" anchor="t" anchorCtr="0">
+        <a:bodyPr spcFirstLastPara="0" vert="horz" wrap="square" lIns="165354" tIns="165354" rIns="220472" bIns="248031" numCol="1" spcCol="1270" anchor="t" anchorCtr="0">
           <a:noAutofit/>
         </a:bodyPr>
         <a:lstStyle/>
         <a:p>
-          <a:pPr marL="285750" lvl="1" indent="-285750" algn="l" defTabSz="1600200">
+          <a:pPr marL="285750" lvl="1" indent="-285750" algn="l" defTabSz="1377950">
             <a:lnSpc>
               <a:spcPct val="90000"/>
             </a:lnSpc>
@@ -8444,10 +8840,13 @@
             </a:spcAft>
             <a:buChar char="•"/>
           </a:pPr>
-          <a:endParaRPr lang="en-GB" sz="3600" kern="1200"/>
+          <a:r>
+            <a:rPr lang="en-GB" sz="3100" kern="1200" dirty="0"/>
+            <a:t>First Name</a:t>
+          </a:r>
         </a:p>
         <a:p>
-          <a:pPr marL="285750" lvl="1" indent="-285750" algn="l" defTabSz="1600200">
+          <a:pPr marL="285750" lvl="1" indent="-285750" algn="l" defTabSz="1377950">
             <a:lnSpc>
               <a:spcPct val="90000"/>
             </a:lnSpc>
@@ -8459,12 +8858,69 @@
             </a:spcAft>
             <a:buChar char="•"/>
           </a:pPr>
-          <a:endParaRPr lang="en-GB" sz="3600" kern="1200"/>
+          <a:r>
+            <a:rPr lang="en-GB" sz="3100" kern="1200" dirty="0"/>
+            <a:t>Last Name</a:t>
+          </a:r>
+        </a:p>
+        <a:p>
+          <a:pPr marL="285750" lvl="1" indent="-285750" algn="l" defTabSz="1377950">
+            <a:lnSpc>
+              <a:spcPct val="90000"/>
+            </a:lnSpc>
+            <a:spcBef>
+              <a:spcPct val="0"/>
+            </a:spcBef>
+            <a:spcAft>
+              <a:spcPct val="15000"/>
+            </a:spcAft>
+            <a:buChar char="•"/>
+          </a:pPr>
+          <a:r>
+            <a:rPr lang="en-GB" sz="3100" kern="1200" dirty="0"/>
+            <a:t>Email</a:t>
+          </a:r>
+        </a:p>
+        <a:p>
+          <a:pPr marL="285750" lvl="1" indent="-285750" algn="l" defTabSz="1377950">
+            <a:lnSpc>
+              <a:spcPct val="90000"/>
+            </a:lnSpc>
+            <a:spcBef>
+              <a:spcPct val="0"/>
+            </a:spcBef>
+            <a:spcAft>
+              <a:spcPct val="15000"/>
+            </a:spcAft>
+            <a:buChar char="•"/>
+          </a:pPr>
+          <a:r>
+            <a:rPr lang="en-GB" sz="3100" kern="1200" dirty="0"/>
+            <a:t>Password</a:t>
+          </a:r>
+        </a:p>
+        <a:p>
+          <a:pPr marL="285750" lvl="1" indent="-285750" algn="l" defTabSz="1377950">
+            <a:lnSpc>
+              <a:spcPct val="90000"/>
+            </a:lnSpc>
+            <a:spcBef>
+              <a:spcPct val="0"/>
+            </a:spcBef>
+            <a:spcAft>
+              <a:spcPct val="15000"/>
+            </a:spcAft>
+            <a:buChar char="•"/>
+          </a:pPr>
+          <a:r>
+            <a:rPr lang="en-GB" sz="3100" kern="1200" dirty="0"/>
+            <a:t>Is staff</a:t>
+          </a:r>
         </a:p>
       </dsp:txBody>
       <dsp:txXfrm>
-        <a:off x="3286" y="1903509"/>
-        <a:ext cx="3203971" cy="1581120"/>
+        <a:off x="3286" y="904213"/>
+        <a:ext cx="3203971" cy="3435710"/>
       </dsp:txXfrm>
     </dsp:sp>
     <dsp:sp modelId="{79B70EC0-E56A-44BA-9329-21DDC463B6E8}">
@@ -8474,8 +8930,8 @@
       </dsp:nvSpPr>
       <dsp:spPr>
         <a:xfrm>
-          <a:off x="3655814" y="866709"/>
-          <a:ext cx="3203971" cy="1036800"/>
+          <a:off x="3655814" y="11413"/>
+          <a:ext cx="3203971" cy="892800"/>
         </a:xfrm>
         <a:prstGeom prst="rect">
           <a:avLst/>
@@ -8517,12 +8973,12 @@
         </a:fontRef>
       </dsp:style>
       <dsp:txBody>
-        <a:bodyPr spcFirstLastPara="0" vert="horz" wrap="square" lIns="256032" tIns="146304" rIns="256032" bIns="146304" numCol="1" spcCol="1270" anchor="ctr" anchorCtr="0">
+        <a:bodyPr spcFirstLastPara="0" vert="horz" wrap="square" lIns="220472" tIns="125984" rIns="220472" bIns="125984" numCol="1" spcCol="1270" anchor="ctr" anchorCtr="0">
           <a:noAutofit/>
         </a:bodyPr>
         <a:lstStyle/>
         <a:p>
-          <a:pPr marL="0" lvl="0" indent="0" algn="ctr" defTabSz="1600200">
+          <a:pPr marL="0" lvl="0" indent="0" algn="ctr" defTabSz="1377950">
             <a:lnSpc>
               <a:spcPct val="90000"/>
             </a:lnSpc>
@@ -8535,14 +8991,14 @@
             <a:buNone/>
           </a:pPr>
           <a:r>
-            <a:rPr lang="en-GB" sz="3600" kern="1200" dirty="0"/>
+            <a:rPr lang="en-GB" sz="3100" kern="1200" dirty="0"/>
             <a:t>Staff-Teaching</a:t>
           </a:r>
         </a:p>
       </dsp:txBody>
       <dsp:txXfrm>
-        <a:off x="3655814" y="866709"/>
-        <a:ext cx="3203971" cy="1036800"/>
+        <a:off x="3655814" y="11413"/>
+        <a:ext cx="3203971" cy="892800"/>
       </dsp:txXfrm>
     </dsp:sp>
     <dsp:sp modelId="{84CFAEEA-BE16-4C92-8ADA-7F14E739DB71}">
@@ -8552,8 +9008,8 @@
       </dsp:nvSpPr>
       <dsp:spPr>
         <a:xfrm>
-          <a:off x="3655814" y="1903509"/>
-          <a:ext cx="3203971" cy="1581120"/>
+          <a:off x="3655814" y="904213"/>
+          <a:ext cx="3203971" cy="3435710"/>
         </a:xfrm>
         <a:prstGeom prst="rect">
           <a:avLst/>
@@ -8597,12 +9053,12 @@
         <a:fontRef idx="minor"/>
       </dsp:style>
       <dsp:txBody>
-        <a:bodyPr spcFirstLastPara="0" vert="horz" wrap="square" lIns="192024" tIns="192024" rIns="256032" bIns="288036" numCol="1" spcCol="1270" anchor="t" anchorCtr="0">
+        <a:bodyPr spcFirstLastPara="0" vert="horz" wrap="square" lIns="165354" tIns="165354" rIns="220472" bIns="248031" numCol="1" spcCol="1270" anchor="t" anchorCtr="0">
           <a:noAutofit/>
         </a:bodyPr>
         <a:lstStyle/>
         <a:p>
-          <a:pPr marL="285750" lvl="1" indent="-285750" algn="l" defTabSz="1600200">
+          <a:pPr marL="285750" lvl="1" indent="-285750" algn="l" defTabSz="1377950">
             <a:lnSpc>
               <a:spcPct val="90000"/>
             </a:lnSpc>
@@ -8614,10 +9070,13 @@
             </a:spcAft>
             <a:buChar char="•"/>
           </a:pPr>
-          <a:endParaRPr lang="en-GB" sz="3600" kern="1200"/>
+          <a:r>
+            <a:rPr lang="en-GB" sz="3100" kern="1200" dirty="0"/>
+            <a:t>First Name</a:t>
+          </a:r>
         </a:p>
         <a:p>
-          <a:pPr marL="285750" lvl="1" indent="-285750" algn="l" defTabSz="1600200">
+          <a:pPr marL="285750" lvl="1" indent="-285750" algn="l" defTabSz="1377950">
             <a:lnSpc>
               <a:spcPct val="90000"/>
             </a:lnSpc>
@@ -8629,12 +9088,88 @@
             </a:spcAft>
             <a:buChar char="•"/>
           </a:pPr>
-          <a:endParaRPr lang="en-GB" sz="3600" kern="1200"/>
+          <a:r>
+            <a:rPr lang="en-GB" sz="3100" kern="1200"/>
+            <a:t>Last Name</a:t>
+          </a:r>
+          <a:endParaRPr lang="en-GB" sz="3100" kern="1200" dirty="0"/>
+        </a:p>
+        <a:p>
+          <a:pPr marL="285750" lvl="1" indent="-285750" algn="l" defTabSz="1377950">
+            <a:lnSpc>
+              <a:spcPct val="90000"/>
+            </a:lnSpc>
+            <a:spcBef>
+              <a:spcPct val="0"/>
+            </a:spcBef>
+            <a:spcAft>
+              <a:spcPct val="15000"/>
+            </a:spcAft>
+            <a:buChar char="•"/>
+          </a:pPr>
+          <a:r>
+            <a:rPr lang="en-GB" sz="3100" kern="1200"/>
+            <a:t>Email</a:t>
+          </a:r>
+          <a:endParaRPr lang="en-GB" sz="3100" kern="1200" dirty="0"/>
+        </a:p>
+        <a:p>
+          <a:pPr marL="285750" lvl="1" indent="-285750" algn="l" defTabSz="1377950">
+            <a:lnSpc>
+              <a:spcPct val="90000"/>
+            </a:lnSpc>
+            <a:spcBef>
+              <a:spcPct val="0"/>
+            </a:spcBef>
+            <a:spcAft>
+              <a:spcPct val="15000"/>
+            </a:spcAft>
+            <a:buChar char="•"/>
+          </a:pPr>
+          <a:r>
+            <a:rPr lang="en-GB" sz="3100" kern="1200"/>
+            <a:t>Password</a:t>
+          </a:r>
+          <a:endParaRPr lang="en-GB" sz="3100" kern="1200" dirty="0"/>
+        </a:p>
+        <a:p>
+          <a:pPr marL="285750" lvl="1" indent="-285750" algn="l" defTabSz="1377950">
+            <a:lnSpc>
+              <a:spcPct val="90000"/>
+            </a:lnSpc>
+            <a:spcBef>
+              <a:spcPct val="0"/>
+            </a:spcBef>
+            <a:spcAft>
+              <a:spcPct val="15000"/>
+            </a:spcAft>
+            <a:buChar char="•"/>
+          </a:pPr>
+          <a:r>
+            <a:rPr lang="en-GB" sz="3100" kern="1200" dirty="0" err="1"/>
+            <a:t>Is_academic</a:t>
+          </a:r>
+          <a:endParaRPr lang="en-GB" sz="3100" kern="1200" dirty="0"/>
+        </a:p>
+        <a:p>
+          <a:pPr marL="285750" lvl="1" indent="-285750" algn="l" defTabSz="1377950">
+            <a:lnSpc>
+              <a:spcPct val="90000"/>
+            </a:lnSpc>
+            <a:spcBef>
+              <a:spcPct val="0"/>
+            </a:spcBef>
+            <a:spcAft>
+              <a:spcPct val="15000"/>
+            </a:spcAft>
+            <a:buChar char="•"/>
+          </a:pPr>
+          <a:endParaRPr lang="en-GB" sz="3100" kern="1200" dirty="0"/>
         </a:p>
       </dsp:txBody>
       <dsp:txXfrm>
-        <a:off x="3655814" y="1903509"/>
-        <a:ext cx="3203971" cy="1581120"/>
+        <a:off x="3655814" y="904213"/>
+        <a:ext cx="3203971" cy="3435710"/>
       </dsp:txXfrm>
     </dsp:sp>
     <dsp:sp modelId="{9AC2F46D-F58D-4EB8-876D-4363C9D71D81}">
@@ -8644,8 +9179,8 @@
       </dsp:nvSpPr>
       <dsp:spPr>
         <a:xfrm>
-          <a:off x="7308342" y="866709"/>
-          <a:ext cx="3203971" cy="1036800"/>
+          <a:off x="7308342" y="11413"/>
+          <a:ext cx="3203971" cy="892800"/>
         </a:xfrm>
         <a:prstGeom prst="rect">
           <a:avLst/>
@@ -8687,12 +9222,12 @@
         </a:fontRef>
       </dsp:style>
       <dsp:txBody>
-        <a:bodyPr spcFirstLastPara="0" vert="horz" wrap="square" lIns="256032" tIns="146304" rIns="256032" bIns="146304" numCol="1" spcCol="1270" anchor="ctr" anchorCtr="0">
+        <a:bodyPr spcFirstLastPara="0" vert="horz" wrap="square" lIns="220472" tIns="125984" rIns="220472" bIns="125984" numCol="1" spcCol="1270" anchor="ctr" anchorCtr="0">
           <a:noAutofit/>
         </a:bodyPr>
         <a:lstStyle/>
         <a:p>
-          <a:pPr marL="0" lvl="0" indent="0" algn="ctr" defTabSz="1600200">
+          <a:pPr marL="0" lvl="0" indent="0" algn="ctr" defTabSz="1377950">
             <a:lnSpc>
               <a:spcPct val="90000"/>
             </a:lnSpc>
@@ -8705,14 +9240,14 @@
             <a:buNone/>
           </a:pPr>
           <a:r>
-            <a:rPr lang="en-GB" sz="3600" kern="1200" dirty="0"/>
+            <a:rPr lang="en-GB" sz="3100" kern="1200" dirty="0"/>
             <a:t>Student</a:t>
           </a:r>
         </a:p>
       </dsp:txBody>
       <dsp:txXfrm>
-        <a:off x="7308342" y="866709"/>
-        <a:ext cx="3203971" cy="1036800"/>
+        <a:off x="7308342" y="11413"/>
+        <a:ext cx="3203971" cy="892800"/>
       </dsp:txXfrm>
     </dsp:sp>
     <dsp:sp modelId="{5F4973BD-9891-4B7F-858A-40B51A75E58F}">
@@ -8722,8 +9257,8 @@
       </dsp:nvSpPr>
       <dsp:spPr>
         <a:xfrm>
-          <a:off x="7308342" y="1903509"/>
-          <a:ext cx="3203971" cy="1581120"/>
+          <a:off x="7308342" y="904213"/>
+          <a:ext cx="3203971" cy="3435710"/>
         </a:xfrm>
         <a:prstGeom prst="rect">
           <a:avLst/>
@@ -8767,12 +9302,12 @@
         <a:fontRef idx="minor"/>
       </dsp:style>
       <dsp:txBody>
-        <a:bodyPr spcFirstLastPara="0" vert="horz" wrap="square" lIns="192024" tIns="192024" rIns="256032" bIns="288036" numCol="1" spcCol="1270" anchor="t" anchorCtr="0">
+        <a:bodyPr spcFirstLastPara="0" vert="horz" wrap="square" lIns="165354" tIns="165354" rIns="220472" bIns="248031" numCol="1" spcCol="1270" anchor="t" anchorCtr="0">
           <a:noAutofit/>
         </a:bodyPr>
         <a:lstStyle/>
         <a:p>
-          <a:pPr marL="285750" lvl="1" indent="-285750" algn="l" defTabSz="1600200">
+          <a:pPr marL="285750" lvl="1" indent="-285750" algn="l" defTabSz="1377950">
             <a:lnSpc>
               <a:spcPct val="90000"/>
             </a:lnSpc>
@@ -8784,10 +9319,13 @@
             </a:spcAft>
             <a:buChar char="•"/>
           </a:pPr>
-          <a:endParaRPr lang="en-GB" sz="3600" kern="1200"/>
+          <a:r>
+            <a:rPr lang="en-GB" sz="3100" kern="1200" dirty="0"/>
+            <a:t>First Name</a:t>
+          </a:r>
         </a:p>
         <a:p>
-          <a:pPr marL="285750" lvl="1" indent="-285750" algn="l" defTabSz="1600200">
+          <a:pPr marL="285750" lvl="1" indent="-285750" algn="l" defTabSz="1377950">
             <a:lnSpc>
               <a:spcPct val="90000"/>
             </a:lnSpc>
@@ -8799,12 +9337,88 @@
             </a:spcAft>
             <a:buChar char="•"/>
           </a:pPr>
-          <a:endParaRPr lang="en-GB" sz="3600" kern="1200"/>
+          <a:r>
+            <a:rPr lang="en-GB" sz="3100" kern="1200"/>
+            <a:t>Last Name</a:t>
+          </a:r>
+          <a:endParaRPr lang="en-GB" sz="3100" kern="1200" dirty="0"/>
+        </a:p>
+        <a:p>
+          <a:pPr marL="285750" lvl="1" indent="-285750" algn="l" defTabSz="1377950">
+            <a:lnSpc>
+              <a:spcPct val="90000"/>
+            </a:lnSpc>
+            <a:spcBef>
+              <a:spcPct val="0"/>
+            </a:spcBef>
+            <a:spcAft>
+              <a:spcPct val="15000"/>
+            </a:spcAft>
+            <a:buChar char="•"/>
+          </a:pPr>
+          <a:r>
+            <a:rPr lang="en-GB" sz="3100" kern="1200"/>
+            <a:t>Email</a:t>
+          </a:r>
+          <a:endParaRPr lang="en-GB" sz="3100" kern="1200" dirty="0"/>
+        </a:p>
+        <a:p>
+          <a:pPr marL="285750" lvl="1" indent="-285750" algn="l" defTabSz="1377950">
+            <a:lnSpc>
+              <a:spcPct val="90000"/>
+            </a:lnSpc>
+            <a:spcBef>
+              <a:spcPct val="0"/>
+            </a:spcBef>
+            <a:spcAft>
+              <a:spcPct val="15000"/>
+            </a:spcAft>
+            <a:buChar char="•"/>
+          </a:pPr>
+          <a:r>
+            <a:rPr lang="en-GB" sz="3100" kern="1200"/>
+            <a:t>Password</a:t>
+          </a:r>
+          <a:endParaRPr lang="en-GB" sz="3100" kern="1200" dirty="0"/>
+        </a:p>
+        <a:p>
+          <a:pPr marL="285750" lvl="1" indent="-285750" algn="l" defTabSz="1377950">
+            <a:lnSpc>
+              <a:spcPct val="90000"/>
+            </a:lnSpc>
+            <a:spcBef>
+              <a:spcPct val="0"/>
+            </a:spcBef>
+            <a:spcAft>
+              <a:spcPct val="15000"/>
+            </a:spcAft>
+            <a:buChar char="•"/>
+          </a:pPr>
+          <a:r>
+            <a:rPr lang="en-GB" sz="3100" kern="1200" dirty="0" err="1"/>
+            <a:t>Is_student</a:t>
+          </a:r>
+          <a:endParaRPr lang="en-GB" sz="3100" kern="1200" dirty="0"/>
+        </a:p>
+        <a:p>
+          <a:pPr marL="285750" lvl="1" indent="-285750" algn="l" defTabSz="1377950">
+            <a:lnSpc>
+              <a:spcPct val="90000"/>
+            </a:lnSpc>
+            <a:spcBef>
+              <a:spcPct val="0"/>
+            </a:spcBef>
+            <a:spcAft>
+              <a:spcPct val="15000"/>
+            </a:spcAft>
+            <a:buChar char="•"/>
+          </a:pPr>
+          <a:endParaRPr lang="en-GB" sz="3100" kern="1200" dirty="0"/>
         </a:p>
       </dsp:txBody>
       <dsp:txXfrm>
-        <a:off x="7308342" y="1903509"/>
-        <a:ext cx="3203971" cy="1581120"/>
+        <a:off x="7308342" y="904213"/>
+        <a:ext cx="3203971" cy="3435710"/>
       </dsp:txXfrm>
     </dsp:sp>
   </dsp:spTree>
@@ -15927,7 +16541,7 @@
           <a:p>
             <a:fld id="{22C015C7-6CA6-40D8-BCB4-2B26807C9380}" type="datetimeFigureOut">
               <a:rPr lang="en-GB" smtClean="0"/>
-              <a:t>18/03/2022</a:t>
+              <a:t>20/03/2022</a:t>
             </a:fld>
             <a:endParaRPr lang="en-GB"/>
           </a:p>
@@ -16127,7 +16741,7 @@
           <a:p>
             <a:fld id="{22C015C7-6CA6-40D8-BCB4-2B26807C9380}" type="datetimeFigureOut">
               <a:rPr lang="en-GB" smtClean="0"/>
-              <a:t>18/03/2022</a:t>
+              <a:t>20/03/2022</a:t>
             </a:fld>
             <a:endParaRPr lang="en-GB"/>
           </a:p>
@@ -16337,7 +16951,7 @@
           <a:p>
             <a:fld id="{22C015C7-6CA6-40D8-BCB4-2B26807C9380}" type="datetimeFigureOut">
               <a:rPr lang="en-GB" smtClean="0"/>
-              <a:t>18/03/2022</a:t>
+              <a:t>20/03/2022</a:t>
             </a:fld>
             <a:endParaRPr lang="en-GB"/>
           </a:p>
@@ -16537,7 +17151,7 @@
           <a:p>
             <a:fld id="{22C015C7-6CA6-40D8-BCB4-2B26807C9380}" type="datetimeFigureOut">
               <a:rPr lang="en-GB" smtClean="0"/>
-              <a:t>18/03/2022</a:t>
+              <a:t>20/03/2022</a:t>
             </a:fld>
             <a:endParaRPr lang="en-GB"/>
           </a:p>
@@ -16813,7 +17427,7 @@
           <a:p>
             <a:fld id="{22C015C7-6CA6-40D8-BCB4-2B26807C9380}" type="datetimeFigureOut">
               <a:rPr lang="en-GB" smtClean="0"/>
-              <a:t>18/03/2022</a:t>
+              <a:t>20/03/2022</a:t>
             </a:fld>
             <a:endParaRPr lang="en-GB"/>
           </a:p>
@@ -17081,7 +17695,7 @@
           <a:p>
             <a:fld id="{22C015C7-6CA6-40D8-BCB4-2B26807C9380}" type="datetimeFigureOut">
               <a:rPr lang="en-GB" smtClean="0"/>
-              <a:t>18/03/2022</a:t>
+              <a:t>20/03/2022</a:t>
             </a:fld>
             <a:endParaRPr lang="en-GB"/>
           </a:p>
@@ -17496,7 +18110,7 @@
           <a:p>
             <a:fld id="{22C015C7-6CA6-40D8-BCB4-2B26807C9380}" type="datetimeFigureOut">
               <a:rPr lang="en-GB" smtClean="0"/>
-              <a:t>18/03/2022</a:t>
+              <a:t>20/03/2022</a:t>
             </a:fld>
             <a:endParaRPr lang="en-GB"/>
           </a:p>
@@ -17638,7 +18252,7 @@
           <a:p>
             <a:fld id="{22C015C7-6CA6-40D8-BCB4-2B26807C9380}" type="datetimeFigureOut">
               <a:rPr lang="en-GB" smtClean="0"/>
-              <a:t>18/03/2022</a:t>
+              <a:t>20/03/2022</a:t>
             </a:fld>
             <a:endParaRPr lang="en-GB"/>
           </a:p>
@@ -17751,7 +18365,7 @@
           <a:p>
             <a:fld id="{22C015C7-6CA6-40D8-BCB4-2B26807C9380}" type="datetimeFigureOut">
               <a:rPr lang="en-GB" smtClean="0"/>
-              <a:t>18/03/2022</a:t>
+              <a:t>20/03/2022</a:t>
             </a:fld>
             <a:endParaRPr lang="en-GB"/>
           </a:p>
@@ -18064,7 +18678,7 @@
           <a:p>
             <a:fld id="{22C015C7-6CA6-40D8-BCB4-2B26807C9380}" type="datetimeFigureOut">
               <a:rPr lang="en-GB" smtClean="0"/>
-              <a:t>18/03/2022</a:t>
+              <a:t>20/03/2022</a:t>
             </a:fld>
             <a:endParaRPr lang="en-GB"/>
           </a:p>
@@ -18353,7 +18967,7 @@
           <a:p>
             <a:fld id="{22C015C7-6CA6-40D8-BCB4-2B26807C9380}" type="datetimeFigureOut">
               <a:rPr lang="en-GB" smtClean="0"/>
-              <a:t>18/03/2022</a:t>
+              <a:t>20/03/2022</a:t>
             </a:fld>
             <a:endParaRPr lang="en-GB"/>
           </a:p>
@@ -18596,7 +19210,7 @@
           <a:p>
             <a:fld id="{22C015C7-6CA6-40D8-BCB4-2B26807C9380}" type="datetimeFigureOut">
               <a:rPr lang="en-GB" smtClean="0"/>
-              <a:t>18/03/2022</a:t>
+              <a:t>20/03/2022</a:t>
             </a:fld>
             <a:endParaRPr lang="en-GB"/>
           </a:p>
@@ -19382,7 +19996,7 @@
             <p:ph idx="1"/>
             <p:extLst>
               <p:ext uri="{D42A27DB-BD31-4B8C-83A1-F6EECF244321}">
-                <p14:modId xmlns:p14="http://schemas.microsoft.com/office/powerpoint/2010/main" val="2716414949"/>
+                <p14:modId xmlns:p14="http://schemas.microsoft.com/office/powerpoint/2010/main" val="1695092340"/>
               </p:ext>
             </p:extLst>
           </p:nvPr>
@@ -19494,8 +20108,8 @@
         </p:nvSpPr>
         <p:spPr>
           <a:xfrm>
-            <a:off x="955964" y="1846613"/>
-            <a:ext cx="10397836" cy="706582"/>
+            <a:off x="838199" y="1846613"/>
+            <a:ext cx="10515601" cy="706582"/>
           </a:xfrm>
           <a:prstGeom prst="roundRect">
             <a:avLst/>
@@ -19543,8 +20157,8 @@
         </p:nvSpPr>
         <p:spPr>
           <a:xfrm>
-            <a:off x="1039091" y="2636322"/>
-            <a:ext cx="10314709" cy="296883"/>
+            <a:off x="838199" y="2636322"/>
+            <a:ext cx="10515601" cy="296883"/>
           </a:xfrm>
           <a:prstGeom prst="rect">
             <a:avLst/>
@@ -19592,8 +20206,8 @@
         </p:nvSpPr>
         <p:spPr>
           <a:xfrm>
-            <a:off x="1039091" y="3016332"/>
-            <a:ext cx="10314708" cy="694707"/>
+            <a:off x="838198" y="3016332"/>
+            <a:ext cx="10515601" cy="694707"/>
           </a:xfrm>
           <a:prstGeom prst="rect">
             <a:avLst/>
@@ -19641,7 +20255,7 @@
         </p:nvSpPr>
         <p:spPr>
           <a:xfrm>
-            <a:off x="1039091" y="3711039"/>
+            <a:off x="838197" y="3711039"/>
             <a:ext cx="1763486" cy="2030680"/>
           </a:xfrm>
           <a:prstGeom prst="rect">
@@ -19690,8 +20304,8 @@
         </p:nvSpPr>
         <p:spPr>
           <a:xfrm>
-            <a:off x="2802577" y="3711039"/>
-            <a:ext cx="5118265" cy="2030680"/>
+            <a:off x="2601683" y="3711039"/>
+            <a:ext cx="5319159" cy="2030680"/>
           </a:xfrm>
           <a:prstGeom prst="rect">
             <a:avLst/>
@@ -19769,15 +20383,7 @@
             <a:pPr algn="ctr"/>
             <a:r>
               <a:rPr lang="en-GB" dirty="0"/>
-              <a:t>Quick Links- Staff </a:t>
-            </a:r>
-            <a:r>
-              <a:rPr lang="en-GB" dirty="0" err="1"/>
-              <a:t>Login,Student</a:t>
-            </a:r>
-            <a:r>
-              <a:rPr lang="en-GB" dirty="0"/>
-              <a:t> Login</a:t>
+              <a:t>Quick Links- Staff Login, Student Login</a:t>
             </a:r>
           </a:p>
         </p:txBody>
@@ -19845,8 +20451,8 @@
         </p:nvSpPr>
         <p:spPr>
           <a:xfrm>
-            <a:off x="1039091" y="5741719"/>
-            <a:ext cx="10314708" cy="435244"/>
+            <a:off x="838196" y="5741719"/>
+            <a:ext cx="10515603" cy="435244"/>
           </a:xfrm>
           <a:prstGeom prst="rect">
             <a:avLst/>
@@ -19875,19 +20481,7 @@
             <a:pPr algn="ctr"/>
             <a:r>
               <a:rPr lang="en-GB" dirty="0"/>
-              <a:t>About us, Maps and </a:t>
-            </a:r>
-            <a:r>
-              <a:rPr lang="en-GB" dirty="0" err="1"/>
-              <a:t>directions,how</a:t>
-            </a:r>
-            <a:r>
-              <a:rPr lang="en-GB" dirty="0"/>
-              <a:t> </a:t>
-            </a:r>
-            <a:r>
-              <a:rPr lang="en-GB"/>
-              <a:t>to apply</a:t>
+              <a:t>About us, Maps and directions, how to apply</a:t>
             </a:r>
           </a:p>
         </p:txBody>

</xml_diff>

<commit_message>
update user mgmt ppt
</commit_message>
<xml_diff>
--- a/Reqs.pptx
+++ b/Reqs.pptx
@@ -5740,13 +5740,16 @@
       </dgm:t>
     </dgm:pt>
     <dgm:pt modelId="{52BA6D45-9B24-4CE1-8F9F-CB685403CFDA}">
-      <dgm:prSet phldrT="[Text]" phldr="1"/>
+      <dgm:prSet phldrT="[Text]"/>
       <dgm:spPr/>
       <dgm:t>
         <a:bodyPr/>
         <a:lstStyle/>
         <a:p>
-          <a:endParaRPr lang="en-GB" dirty="0"/>
+          <a:r>
+            <a:rPr lang="en-GB" dirty="0"/>
+            <a:t>Is active</a:t>
+          </a:r>
         </a:p>
       </dgm:t>
     </dgm:pt>
@@ -5845,13 +5848,16 @@
       </dgm:t>
     </dgm:pt>
     <dgm:pt modelId="{7BB3457D-B4A3-41C3-A2D5-BA916C548AB9}">
-      <dgm:prSet phldrT="[Text]" phldr="1"/>
+      <dgm:prSet phldrT="[Text]"/>
       <dgm:spPr/>
       <dgm:t>
         <a:bodyPr/>
         <a:lstStyle/>
         <a:p>
-          <a:endParaRPr lang="en-GB" dirty="0"/>
+          <a:r>
+            <a:rPr lang="en-GB" dirty="0"/>
+            <a:t>Is active</a:t>
+          </a:r>
         </a:p>
       </dgm:t>
     </dgm:pt>
@@ -5894,10 +5900,24 @@
     <dgm:pt modelId="{61C5A039-220D-4BBC-8762-63EC4D3C038C}" type="parTrans" cxnId="{3EF15728-8D37-43A6-A2BA-2CF68DE07DBA}">
       <dgm:prSet/>
       <dgm:spPr/>
+      <dgm:t>
+        <a:bodyPr/>
+        <a:lstStyle/>
+        <a:p>
+          <a:endParaRPr lang="en-GB"/>
+        </a:p>
+      </dgm:t>
     </dgm:pt>
     <dgm:pt modelId="{572C1486-0853-423A-ABA7-A094B9A11371}" type="sibTrans" cxnId="{3EF15728-8D37-43A6-A2BA-2CF68DE07DBA}">
       <dgm:prSet/>
       <dgm:spPr/>
+      <dgm:t>
+        <a:bodyPr/>
+        <a:lstStyle/>
+        <a:p>
+          <a:endParaRPr lang="en-GB"/>
+        </a:p>
+      </dgm:t>
     </dgm:pt>
     <dgm:pt modelId="{967EFD47-197B-4577-AAC3-35DD26117B36}">
       <dgm:prSet phldrT="[Text]"/>
@@ -5916,10 +5936,24 @@
     <dgm:pt modelId="{68D62C6D-70F9-43DF-9F58-BF3A3B4BC0C6}" type="parTrans" cxnId="{99D38445-9CB2-4828-A446-6A4BF00CCD4D}">
       <dgm:prSet/>
       <dgm:spPr/>
+      <dgm:t>
+        <a:bodyPr/>
+        <a:lstStyle/>
+        <a:p>
+          <a:endParaRPr lang="en-GB"/>
+        </a:p>
+      </dgm:t>
     </dgm:pt>
     <dgm:pt modelId="{85271968-B736-4510-B1B2-0C934F7C14FF}" type="sibTrans" cxnId="{99D38445-9CB2-4828-A446-6A4BF00CCD4D}">
       <dgm:prSet/>
       <dgm:spPr/>
+      <dgm:t>
+        <a:bodyPr/>
+        <a:lstStyle/>
+        <a:p>
+          <a:endParaRPr lang="en-GB"/>
+        </a:p>
+      </dgm:t>
     </dgm:pt>
     <dgm:pt modelId="{C72E0B00-FCCF-4068-9417-3543BC3D0BE0}">
       <dgm:prSet phldrT="[Text]"/>
@@ -5938,10 +5972,24 @@
     <dgm:pt modelId="{CC738099-EA19-4EDA-9815-824FDC661ACA}" type="parTrans" cxnId="{D18F77A0-2F98-43BB-B9E4-9A8BCF80A3CB}">
       <dgm:prSet/>
       <dgm:spPr/>
+      <dgm:t>
+        <a:bodyPr/>
+        <a:lstStyle/>
+        <a:p>
+          <a:endParaRPr lang="en-GB"/>
+        </a:p>
+      </dgm:t>
     </dgm:pt>
     <dgm:pt modelId="{6428DA89-02F1-45C0-8241-69D5F9CAF8C3}" type="sibTrans" cxnId="{D18F77A0-2F98-43BB-B9E4-9A8BCF80A3CB}">
       <dgm:prSet/>
       <dgm:spPr/>
+      <dgm:t>
+        <a:bodyPr/>
+        <a:lstStyle/>
+        <a:p>
+          <a:endParaRPr lang="en-GB"/>
+        </a:p>
+      </dgm:t>
     </dgm:pt>
     <dgm:pt modelId="{7BB1C75D-FD04-4A16-AB30-64B2A0BDD377}">
       <dgm:prSet/>
@@ -6238,6 +6286,130 @@
           <a:endParaRPr lang="en-GB"/>
         </a:p>
       </dgm:t>
+    </dgm:pt>
+    <dgm:pt modelId="{BF7ACC5E-53E3-4724-96C8-C110BD354330}">
+      <dgm:prSet phldrT="[Text]"/>
+      <dgm:spPr/>
+      <dgm:t>
+        <a:bodyPr/>
+        <a:lstStyle/>
+        <a:p>
+          <a:r>
+            <a:rPr lang="en-GB" dirty="0"/>
+            <a:t>Is super admin</a:t>
+          </a:r>
+        </a:p>
+      </dgm:t>
+    </dgm:pt>
+    <dgm:pt modelId="{B2C39C1E-2330-437C-9D4B-2D82737BC5F8}" type="parTrans" cxnId="{C7CA74FE-1FCB-4778-8136-B7BDD745305E}">
+      <dgm:prSet/>
+      <dgm:spPr/>
+      <dgm:t>
+        <a:bodyPr/>
+        <a:lstStyle/>
+        <a:p>
+          <a:endParaRPr lang="en-GB"/>
+        </a:p>
+      </dgm:t>
+    </dgm:pt>
+    <dgm:pt modelId="{539372CE-082A-421E-BFBA-5655C0CF01CA}" type="sibTrans" cxnId="{C7CA74FE-1FCB-4778-8136-B7BDD745305E}">
+      <dgm:prSet/>
+      <dgm:spPr/>
+      <dgm:t>
+        <a:bodyPr/>
+        <a:lstStyle/>
+        <a:p>
+          <a:endParaRPr lang="en-GB"/>
+        </a:p>
+      </dgm:t>
+    </dgm:pt>
+    <dgm:pt modelId="{46A02D3A-5747-4620-A544-0C041E797871}">
+      <dgm:prSet phldrT="[Text]"/>
+      <dgm:spPr/>
+      <dgm:t>
+        <a:bodyPr/>
+        <a:lstStyle/>
+        <a:p>
+          <a:r>
+            <a:rPr lang="en-GB" dirty="0"/>
+            <a:t>Is Active</a:t>
+          </a:r>
+        </a:p>
+      </dgm:t>
+    </dgm:pt>
+    <dgm:pt modelId="{010D6392-2B4E-4CF3-9B96-551D1C98F820}" type="parTrans" cxnId="{39DC3AAE-58C9-4DEF-AE5D-F0BE921A4377}">
+      <dgm:prSet/>
+      <dgm:spPr/>
+    </dgm:pt>
+    <dgm:pt modelId="{B7B598D2-6B9C-40CA-BE9E-A35F355D46B2}" type="sibTrans" cxnId="{39DC3AAE-58C9-4DEF-AE5D-F0BE921A4377}">
+      <dgm:prSet/>
+      <dgm:spPr/>
+    </dgm:pt>
+    <dgm:pt modelId="{FDFEC515-78B3-4281-920B-DA04539E560D}">
+      <dgm:prSet phldrT="[Text]"/>
+      <dgm:spPr/>
+      <dgm:t>
+        <a:bodyPr/>
+        <a:lstStyle/>
+        <a:p>
+          <a:r>
+            <a:rPr lang="en-GB" dirty="0"/>
+            <a:t>Is Enrolled</a:t>
+          </a:r>
+        </a:p>
+      </dgm:t>
+    </dgm:pt>
+    <dgm:pt modelId="{19E6C3A1-B639-4134-BB98-5B1390325066}" type="parTrans" cxnId="{1B022B93-3978-485C-87B7-0437F882F448}">
+      <dgm:prSet/>
+      <dgm:spPr/>
+    </dgm:pt>
+    <dgm:pt modelId="{2C0E7A1B-E1AA-4C43-98A7-715AA4ACF906}" type="sibTrans" cxnId="{1B022B93-3978-485C-87B7-0437F882F448}">
+      <dgm:prSet/>
+      <dgm:spPr/>
+    </dgm:pt>
+    <dgm:pt modelId="{3B1071D5-1E3B-4BCC-B2AB-FB840919FA3D}">
+      <dgm:prSet phldrT="[Text]"/>
+      <dgm:spPr/>
+      <dgm:t>
+        <a:bodyPr/>
+        <a:lstStyle/>
+        <a:p>
+          <a:r>
+            <a:rPr lang="en-GB" dirty="0"/>
+            <a:t>Is Suspended</a:t>
+          </a:r>
+        </a:p>
+      </dgm:t>
+    </dgm:pt>
+    <dgm:pt modelId="{725C0F68-998C-4B5E-A159-F076CF904B3C}" type="parTrans" cxnId="{B552DF16-87A4-4152-A6A0-D758193DAEF8}">
+      <dgm:prSet/>
+      <dgm:spPr/>
+    </dgm:pt>
+    <dgm:pt modelId="{B5EA23F2-7F3D-46DB-B9CE-A18A60CDA51F}" type="sibTrans" cxnId="{B552DF16-87A4-4152-A6A0-D758193DAEF8}">
+      <dgm:prSet/>
+      <dgm:spPr/>
+    </dgm:pt>
+    <dgm:pt modelId="{D2A4E259-AA0B-4F74-859B-CC607E1FAF74}">
+      <dgm:prSet phldrT="[Text]"/>
+      <dgm:spPr/>
+      <dgm:t>
+        <a:bodyPr/>
+        <a:lstStyle/>
+        <a:p>
+          <a:r>
+            <a:rPr lang="en-GB" dirty="0"/>
+            <a:t>Is Stand By</a:t>
+          </a:r>
+        </a:p>
+      </dgm:t>
+    </dgm:pt>
+    <dgm:pt modelId="{70C4BD03-CC98-404B-919F-66A1E29D4C9B}" type="parTrans" cxnId="{74071C1D-B1F9-49C9-B038-612298541185}">
+      <dgm:prSet/>
+      <dgm:spPr/>
+    </dgm:pt>
+    <dgm:pt modelId="{E63C3DD3-55BF-4389-8FD6-21EF46F2857A}" type="sibTrans" cxnId="{74071C1D-B1F9-49C9-B038-612298541185}">
+      <dgm:prSet/>
+      <dgm:spPr/>
     </dgm:pt>
     <dgm:pt modelId="{23B3B2DC-99F2-42CB-9E15-AF4B4733B5F9}" type="pres">
       <dgm:prSet presAssocID="{AEDA2EAD-BB61-49A3-9944-D4F07D68DAAE}" presName="Name0" presStyleCnt="0">
@@ -6325,8 +6497,11 @@
     </dgm:pt>
   </dgm:ptLst>
   <dgm:cxnLst>
+    <dgm:cxn modelId="{2FC5D206-304A-4F66-800F-DFBB724E2653}" type="presOf" srcId="{FDFEC515-78B3-4281-920B-DA04539E560D}" destId="{5F4973BD-9891-4B7F-858A-40B51A75E58F}" srcOrd="0" destOrd="6" presId="urn:microsoft.com/office/officeart/2005/8/layout/hList1"/>
     <dgm:cxn modelId="{34CE7E08-408E-48F7-8228-93CE4618A34E}" type="presOf" srcId="{AEDA2EAD-BB61-49A3-9944-D4F07D68DAAE}" destId="{23B3B2DC-99F2-42CB-9E15-AF4B4733B5F9}" srcOrd="0" destOrd="0" presId="urn:microsoft.com/office/officeart/2005/8/layout/hList1"/>
     <dgm:cxn modelId="{37F30611-AB5E-4A95-9962-D0F8360C47F5}" srcId="{236EC2F7-694E-442C-AEFC-0CA4CA578B4B}" destId="{044D7A21-C5DD-42E1-819B-93B018518A17}" srcOrd="2" destOrd="0" parTransId="{B1E58405-39E5-48FC-91BB-5DEC14D2E655}" sibTransId="{41DA7849-4AC8-4C47-8D14-A8BB180F33A3}"/>
+    <dgm:cxn modelId="{B552DF16-87A4-4152-A6A0-D758193DAEF8}" srcId="{CEDF3ADE-318A-4C89-B782-0CD2821E0806}" destId="{3B1071D5-1E3B-4BCC-B2AB-FB840919FA3D}" srcOrd="7" destOrd="0" parTransId="{725C0F68-998C-4B5E-A159-F076CF904B3C}" sibTransId="{B5EA23F2-7F3D-46DB-B9CE-A18A60CDA51F}"/>
+    <dgm:cxn modelId="{74071C1D-B1F9-49C9-B038-612298541185}" srcId="{CEDF3ADE-318A-4C89-B782-0CD2821E0806}" destId="{D2A4E259-AA0B-4F74-859B-CC607E1FAF74}" srcOrd="8" destOrd="0" parTransId="{70C4BD03-CC98-404B-919F-66A1E29D4C9B}" sibTransId="{E63C3DD3-55BF-4389-8FD6-21EF46F2857A}"/>
     <dgm:cxn modelId="{DF510624-AB3C-4E38-987E-5BF8774DB398}" type="presOf" srcId="{F2FDF98F-70DD-43F3-A937-79607D32FF73}" destId="{5F4973BD-9891-4B7F-858A-40B51A75E58F}" srcOrd="0" destOrd="0" presId="urn:microsoft.com/office/officeart/2005/8/layout/hList1"/>
     <dgm:cxn modelId="{177A8825-C0A8-418D-B097-DA02AE3E742F}" type="presOf" srcId="{FC68D89F-F60C-4647-B6F9-906AFDF65E2F}" destId="{66298721-1ACF-476A-877A-BB5E732D8506}" srcOrd="0" destOrd="0" presId="urn:microsoft.com/office/officeart/2005/8/layout/hList1"/>
     <dgm:cxn modelId="{09CB7126-D29B-49C5-9CE2-E1A45C7E17A8}" type="presOf" srcId="{4D85D399-42FF-4153-936A-7B8CCDD332C3}" destId="{84CFAEEA-BE16-4C92-8ADA-7F14E739DB71}" srcOrd="0" destOrd="3" presId="urn:microsoft.com/office/officeart/2005/8/layout/hList1"/>
@@ -6337,8 +6512,10 @@
     <dgm:cxn modelId="{5EF2643B-C4B3-48CF-B582-69F681319338}" type="presOf" srcId="{60A08C7C-7B9A-47F8-BECE-F41001797542}" destId="{5F4973BD-9891-4B7F-858A-40B51A75E58F}" srcOrd="0" destOrd="4" presId="urn:microsoft.com/office/officeart/2005/8/layout/hList1"/>
     <dgm:cxn modelId="{64B43C5C-B80C-4C1B-8F12-AC387124B87E}" type="presOf" srcId="{7BB3457D-B4A3-41C3-A2D5-BA916C548AB9}" destId="{5F4973BD-9891-4B7F-858A-40B51A75E58F}" srcOrd="0" destOrd="5" presId="urn:microsoft.com/office/officeart/2005/8/layout/hList1"/>
     <dgm:cxn modelId="{99CE925C-9509-4DCF-A69B-C4E1669A8B90}" srcId="{236EC2F7-694E-442C-AEFC-0CA4CA578B4B}" destId="{52BA6D45-9B24-4CE1-8F9F-CB685403CFDA}" srcOrd="5" destOrd="0" parTransId="{4DA2886A-E09E-4238-950C-884D166738AA}" sibTransId="{E1A4555D-CCCE-47DF-B8E1-9427F088500D}"/>
+    <dgm:cxn modelId="{0C7B6C60-1294-4337-A1FD-4D0F520FA85B}" type="presOf" srcId="{D2A4E259-AA0B-4F74-859B-CC607E1FAF74}" destId="{5F4973BD-9891-4B7F-858A-40B51A75E58F}" srcOrd="0" destOrd="8" presId="urn:microsoft.com/office/officeart/2005/8/layout/hList1"/>
     <dgm:cxn modelId="{8C3A8F63-87BC-4FD9-83A6-653626F75E71}" type="presOf" srcId="{CEDF3ADE-318A-4C89-B782-0CD2821E0806}" destId="{9AC2F46D-F58D-4EB8-876D-4363C9D71D81}" srcOrd="0" destOrd="0" presId="urn:microsoft.com/office/officeart/2005/8/layout/hList1"/>
     <dgm:cxn modelId="{99D38445-9CB2-4828-A446-6A4BF00CCD4D}" srcId="{C9D181AB-59E9-4ACC-84CB-6698C49A5810}" destId="{967EFD47-197B-4577-AAC3-35DD26117B36}" srcOrd="3" destOrd="0" parTransId="{68D62C6D-70F9-43DF-9F58-BF3A3B4BC0C6}" sibTransId="{85271968-B736-4510-B1B2-0C934F7C14FF}"/>
+    <dgm:cxn modelId="{A03F5166-5854-423D-8BAD-011DA61E1B1F}" type="presOf" srcId="{BF7ACC5E-53E3-4724-96C8-C110BD354330}" destId="{66298721-1ACF-476A-877A-BB5E732D8506}" srcOrd="0" destOrd="5" presId="urn:microsoft.com/office/officeart/2005/8/layout/hList1"/>
     <dgm:cxn modelId="{E5121F72-661E-413F-8567-F13BA5C064F9}" srcId="{CEDF3ADE-318A-4C89-B782-0CD2821E0806}" destId="{7BB3457D-B4A3-41C3-A2D5-BA916C548AB9}" srcOrd="5" destOrd="0" parTransId="{E884D1AD-4342-4A4E-B342-54C7D25A5CAE}" sibTransId="{2111A4DF-7035-47D4-81C9-2CEFD745D3AB}"/>
     <dgm:cxn modelId="{123CA175-BA40-42DA-A809-911C0B9A8B19}" type="presOf" srcId="{7BB1C75D-FD04-4A16-AB30-64B2A0BDD377}" destId="{84CFAEEA-BE16-4C92-8ADA-7F14E739DB71}" srcOrd="0" destOrd="1" presId="urn:microsoft.com/office/officeart/2005/8/layout/hList1"/>
     <dgm:cxn modelId="{1DEA8C77-A88F-471D-9B05-359327C36765}" type="presOf" srcId="{5CC975A3-C63B-4278-B5F4-F0450B0373DF}" destId="{5F4973BD-9891-4B7F-858A-40B51A75E58F}" srcOrd="0" destOrd="3" presId="urn:microsoft.com/office/officeart/2005/8/layout/hList1"/>
@@ -6347,12 +6524,15 @@
     <dgm:cxn modelId="{37919885-0E1B-417F-95BC-715AFBCE96F0}" srcId="{236EC2F7-694E-442C-AEFC-0CA4CA578B4B}" destId="{5BE2FC6F-F276-496D-826B-6F19E433EF96}" srcOrd="4" destOrd="0" parTransId="{82F843BF-C457-4FAA-BC88-5FCB4B74B9E0}" sibTransId="{492A358F-638B-411B-A82E-102BEDE9C67B}"/>
     <dgm:cxn modelId="{D4E75D86-6EA9-4C17-A285-3FFC1F3BE1A8}" type="presOf" srcId="{7CFBD1F0-4FC2-4656-A529-3A6F82572A34}" destId="{5F4973BD-9891-4B7F-858A-40B51A75E58F}" srcOrd="0" destOrd="1" presId="urn:microsoft.com/office/officeart/2005/8/layout/hList1"/>
     <dgm:cxn modelId="{79596586-2E3F-45EA-AF7C-597B8B27354F}" type="presOf" srcId="{87A6A348-6BD7-4A0D-B9A3-B51FE2819956}" destId="{66298721-1ACF-476A-877A-BB5E732D8506}" srcOrd="0" destOrd="1" presId="urn:microsoft.com/office/officeart/2005/8/layout/hList1"/>
+    <dgm:cxn modelId="{1B022B93-3978-485C-87B7-0437F882F448}" srcId="{CEDF3ADE-318A-4C89-B782-0CD2821E0806}" destId="{FDFEC515-78B3-4281-920B-DA04539E560D}" srcOrd="6" destOrd="0" parTransId="{19E6C3A1-B639-4134-BB98-5B1390325066}" sibTransId="{2C0E7A1B-E1AA-4C43-98A7-715AA4ACF906}"/>
     <dgm:cxn modelId="{52D83F9B-0D03-41ED-A483-752CE8B84887}" type="presOf" srcId="{967EFD47-197B-4577-AAC3-35DD26117B36}" destId="{66298721-1ACF-476A-877A-BB5E732D8506}" srcOrd="0" destOrd="3" presId="urn:microsoft.com/office/officeart/2005/8/layout/hList1"/>
     <dgm:cxn modelId="{6E685F9B-91D0-4944-9617-C78A8C95A049}" type="presOf" srcId="{FA5C6EAE-9881-4B7A-B2C9-31BF0B008231}" destId="{84CFAEEA-BE16-4C92-8ADA-7F14E739DB71}" srcOrd="0" destOrd="0" presId="urn:microsoft.com/office/officeart/2005/8/layout/hList1"/>
     <dgm:cxn modelId="{6E9D549C-6368-470F-B4FE-F6ED34B1CFCC}" srcId="{C9D181AB-59E9-4ACC-84CB-6698C49A5810}" destId="{87A6A348-6BD7-4A0D-B9A3-B51FE2819956}" srcOrd="1" destOrd="0" parTransId="{CF794BC3-BB7D-4D37-8181-00B99D80B97E}" sibTransId="{8F31144E-15B3-4C5B-9701-4D88AB5196DC}"/>
     <dgm:cxn modelId="{6E907C9C-1B5D-447E-A980-6086E9B2ED88}" srcId="{236EC2F7-694E-442C-AEFC-0CA4CA578B4B}" destId="{7BB1C75D-FD04-4A16-AB30-64B2A0BDD377}" srcOrd="1" destOrd="0" parTransId="{439EF2EF-9D54-4423-B528-F61CCC888BA7}" sibTransId="{BF1743C3-56EF-4E06-97E4-F87E1DD4D8EC}"/>
     <dgm:cxn modelId="{D18F77A0-2F98-43BB-B9E4-9A8BCF80A3CB}" srcId="{C9D181AB-59E9-4ACC-84CB-6698C49A5810}" destId="{C72E0B00-FCCF-4068-9417-3543BC3D0BE0}" srcOrd="4" destOrd="0" parTransId="{CC738099-EA19-4EDA-9815-824FDC661ACA}" sibTransId="{6428DA89-02F1-45C0-8241-69D5F9CAF8C3}"/>
+    <dgm:cxn modelId="{88CFD5A1-B1CD-4382-9AFC-FDAEE1D38FFE}" type="presOf" srcId="{46A02D3A-5747-4620-A544-0C041E797871}" destId="{66298721-1ACF-476A-877A-BB5E732D8506}" srcOrd="0" destOrd="6" presId="urn:microsoft.com/office/officeart/2005/8/layout/hList1"/>
     <dgm:cxn modelId="{EE5885A4-E869-413F-9F4B-102437ACF864}" srcId="{CEDF3ADE-318A-4C89-B782-0CD2821E0806}" destId="{60A08C7C-7B9A-47F8-BECE-F41001797542}" srcOrd="4" destOrd="0" parTransId="{39C943FA-7E5D-49A4-B571-5348FA482536}" sibTransId="{4BDEECB2-DCD8-4EB4-BFD6-9E28559BF7FA}"/>
+    <dgm:cxn modelId="{39DC3AAE-58C9-4DEF-AE5D-F0BE921A4377}" srcId="{C9D181AB-59E9-4ACC-84CB-6698C49A5810}" destId="{46A02D3A-5747-4620-A544-0C041E797871}" srcOrd="6" destOrd="0" parTransId="{010D6392-2B4E-4CF3-9B96-551D1C98F820}" sibTransId="{B7B598D2-6B9C-40CA-BE9E-A35F355D46B2}"/>
     <dgm:cxn modelId="{BCCA8FC0-BB46-4D4F-82A5-624C2EF40207}" srcId="{AEDA2EAD-BB61-49A3-9944-D4F07D68DAAE}" destId="{CEDF3ADE-318A-4C89-B782-0CD2821E0806}" srcOrd="2" destOrd="0" parTransId="{9CDDDA33-D0F3-4532-8918-B2C8CA295BBC}" sibTransId="{27A02D60-D35D-479A-84B6-68A30BA8A68D}"/>
     <dgm:cxn modelId="{2CA47AC3-E622-4C1D-969C-861A8BD8ADC9}" type="presOf" srcId="{5BE2FC6F-F276-496D-826B-6F19E433EF96}" destId="{84CFAEEA-BE16-4C92-8ADA-7F14E739DB71}" srcOrd="0" destOrd="4" presId="urn:microsoft.com/office/officeart/2005/8/layout/hList1"/>
     <dgm:cxn modelId="{CE1154CB-6E19-4DD3-913B-955A8A87DFF3}" srcId="{CEDF3ADE-318A-4C89-B782-0CD2821E0806}" destId="{F2FDF98F-70DD-43F3-A937-79607D32FF73}" srcOrd="0" destOrd="0" parTransId="{CAF1C282-2B7F-4262-8E2F-F6BD78135C70}" sibTransId="{3A311996-AA89-4476-A8B3-95DAF47393A7}"/>
@@ -6361,10 +6541,12 @@
     <dgm:cxn modelId="{3345B0DB-6D1F-42BF-8F23-257ED410970D}" srcId="{236EC2F7-694E-442C-AEFC-0CA4CA578B4B}" destId="{FA5C6EAE-9881-4B7A-B2C9-31BF0B008231}" srcOrd="0" destOrd="0" parTransId="{6C53873B-8024-4ECC-8F84-5E5FC2A18D7F}" sibTransId="{77F68DCC-0434-4E37-A897-F9DA5A735893}"/>
     <dgm:cxn modelId="{B27439DE-C64F-48E3-982D-70C281FBA858}" srcId="{236EC2F7-694E-442C-AEFC-0CA4CA578B4B}" destId="{4D85D399-42FF-4153-936A-7B8CCDD332C3}" srcOrd="3" destOrd="0" parTransId="{A4AE7189-5D3D-4D82-91B2-62CCEC34E774}" sibTransId="{1493E739-E2C5-470B-B443-BED5A9944E5F}"/>
     <dgm:cxn modelId="{60F0E6E5-59F4-47E2-8D6B-A149207F4E71}" type="presOf" srcId="{C9D181AB-59E9-4ACC-84CB-6698C49A5810}" destId="{E034A9F9-FC51-4A14-853E-7D429BE56EDE}" srcOrd="0" destOrd="0" presId="urn:microsoft.com/office/officeart/2005/8/layout/hList1"/>
+    <dgm:cxn modelId="{042DA2E7-BE26-47A6-AB0A-379C4CC465BF}" type="presOf" srcId="{3B1071D5-1E3B-4BCC-B2AB-FB840919FA3D}" destId="{5F4973BD-9891-4B7F-858A-40B51A75E58F}" srcOrd="0" destOrd="7" presId="urn:microsoft.com/office/officeart/2005/8/layout/hList1"/>
     <dgm:cxn modelId="{32CC24ED-991B-44DA-96F7-AFCB124924BD}" srcId="{AEDA2EAD-BB61-49A3-9944-D4F07D68DAAE}" destId="{C9D181AB-59E9-4ACC-84CB-6698C49A5810}" srcOrd="0" destOrd="0" parTransId="{A41265EE-8C0D-4C5A-8122-263C69360951}" sibTransId="{F73ED508-90B6-4432-9DC7-06FD39E16A21}"/>
     <dgm:cxn modelId="{0EFA96F3-5144-4872-B030-F012AFC6CE62}" type="presOf" srcId="{C72E0B00-FCCF-4068-9417-3543BC3D0BE0}" destId="{66298721-1ACF-476A-877A-BB5E732D8506}" srcOrd="0" destOrd="4" presId="urn:microsoft.com/office/officeart/2005/8/layout/hList1"/>
     <dgm:cxn modelId="{EA3AECFC-40AF-4D2C-9F72-F66E838D2DD6}" srcId="{CEDF3ADE-318A-4C89-B782-0CD2821E0806}" destId="{5CC975A3-C63B-4278-B5F4-F0450B0373DF}" srcOrd="3" destOrd="0" parTransId="{FE4745DD-BF8B-4BB4-89B8-4507388FB87F}" sibTransId="{373BA41C-D3D6-4A61-88D1-EDE1879C0956}"/>
     <dgm:cxn modelId="{C17961FE-F54D-484B-A3B2-D1B79D4E77BA}" type="presOf" srcId="{EA5BA009-40A0-4498-A683-8BF0B329EA4C}" destId="{66298721-1ACF-476A-877A-BB5E732D8506}" srcOrd="0" destOrd="2" presId="urn:microsoft.com/office/officeart/2005/8/layout/hList1"/>
+    <dgm:cxn modelId="{C7CA74FE-1FCB-4778-8136-B7BDD745305E}" srcId="{C9D181AB-59E9-4ACC-84CB-6698C49A5810}" destId="{BF7ACC5E-53E3-4724-96C8-C110BD354330}" srcOrd="5" destOrd="0" parTransId="{B2C39C1E-2330-437C-9D4B-2D82737BC5F8}" sibTransId="{539372CE-082A-421E-BFBA-5655C0CF01CA}"/>
     <dgm:cxn modelId="{9DBDC4FE-1648-459A-83BB-F059B48BC24B}" type="presOf" srcId="{236EC2F7-694E-442C-AEFC-0CA4CA578B4B}" destId="{79B70EC0-E56A-44BA-9329-21DDC463B6E8}" srcOrd="0" destOrd="0" presId="urn:microsoft.com/office/officeart/2005/8/layout/hList1"/>
     <dgm:cxn modelId="{F244B936-766B-4755-AD7F-2775109AF0AB}" type="presParOf" srcId="{23B3B2DC-99F2-42CB-9E15-AF4B4733B5F9}" destId="{1F6BF2FD-51F2-4227-8E9C-3C33F2F97D7A}" srcOrd="0" destOrd="0" presId="urn:microsoft.com/office/officeart/2005/8/layout/hList1"/>
     <dgm:cxn modelId="{74664300-2CF2-4167-86E4-54F1A9FA7B2F}" type="presParOf" srcId="{1F6BF2FD-51F2-4227-8E9C-3C33F2F97D7A}" destId="{E034A9F9-FC51-4A14-853E-7D429BE56EDE}" srcOrd="0" destOrd="0" presId="urn:microsoft.com/office/officeart/2005/8/layout/hList1"/>
@@ -8700,8 +8882,8 @@
       </dsp:nvSpPr>
       <dsp:spPr>
         <a:xfrm>
-          <a:off x="3286" y="11413"/>
-          <a:ext cx="3203971" cy="892800"/>
+          <a:off x="3286" y="29337"/>
+          <a:ext cx="3203971" cy="662400"/>
         </a:xfrm>
         <a:prstGeom prst="rect">
           <a:avLst/>
@@ -8743,12 +8925,12 @@
         </a:fontRef>
       </dsp:style>
       <dsp:txBody>
-        <a:bodyPr spcFirstLastPara="0" vert="horz" wrap="square" lIns="220472" tIns="125984" rIns="220472" bIns="125984" numCol="1" spcCol="1270" anchor="ctr" anchorCtr="0">
+        <a:bodyPr spcFirstLastPara="0" vert="horz" wrap="square" lIns="163576" tIns="93472" rIns="163576" bIns="93472" numCol="1" spcCol="1270" anchor="ctr" anchorCtr="0">
           <a:noAutofit/>
         </a:bodyPr>
         <a:lstStyle/>
         <a:p>
-          <a:pPr marL="0" lvl="0" indent="0" algn="ctr" defTabSz="1377950">
+          <a:pPr marL="0" lvl="0" indent="0" algn="ctr" defTabSz="1022350">
             <a:lnSpc>
               <a:spcPct val="90000"/>
             </a:lnSpc>
@@ -8761,14 +8943,14 @@
             <a:buNone/>
           </a:pPr>
           <a:r>
-            <a:rPr lang="en-GB" sz="3100" kern="1200" dirty="0"/>
+            <a:rPr lang="en-GB" sz="2300" kern="1200" dirty="0"/>
             <a:t>Staff-Admin</a:t>
           </a:r>
         </a:p>
       </dsp:txBody>
       <dsp:txXfrm>
-        <a:off x="3286" y="11413"/>
-        <a:ext cx="3203971" cy="892800"/>
+        <a:off x="3286" y="29337"/>
+        <a:ext cx="3203971" cy="662400"/>
       </dsp:txXfrm>
     </dsp:sp>
     <dsp:sp modelId="{66298721-1ACF-476A-877A-BB5E732D8506}">
@@ -8778,8 +8960,8 @@
       </dsp:nvSpPr>
       <dsp:spPr>
         <a:xfrm>
-          <a:off x="3286" y="904213"/>
-          <a:ext cx="3203971" cy="3435710"/>
+          <a:off x="3286" y="691737"/>
+          <a:ext cx="3203971" cy="3630262"/>
         </a:xfrm>
         <a:prstGeom prst="rect">
           <a:avLst/>
@@ -8823,12 +9005,12 @@
         <a:fontRef idx="minor"/>
       </dsp:style>
       <dsp:txBody>
-        <a:bodyPr spcFirstLastPara="0" vert="horz" wrap="square" lIns="165354" tIns="165354" rIns="220472" bIns="248031" numCol="1" spcCol="1270" anchor="t" anchorCtr="0">
+        <a:bodyPr spcFirstLastPara="0" vert="horz" wrap="square" lIns="122682" tIns="122682" rIns="163576" bIns="184023" numCol="1" spcCol="1270" anchor="t" anchorCtr="0">
           <a:noAutofit/>
         </a:bodyPr>
         <a:lstStyle/>
         <a:p>
-          <a:pPr marL="285750" lvl="1" indent="-285750" algn="l" defTabSz="1377950">
+          <a:pPr marL="228600" lvl="1" indent="-228600" algn="l" defTabSz="1022350">
             <a:lnSpc>
               <a:spcPct val="90000"/>
             </a:lnSpc>
@@ -8841,12 +9023,12 @@
             <a:buChar char="•"/>
           </a:pPr>
           <a:r>
-            <a:rPr lang="en-GB" sz="3100" kern="1200" dirty="0"/>
+            <a:rPr lang="en-GB" sz="2300" kern="1200" dirty="0"/>
             <a:t>First Name</a:t>
           </a:r>
         </a:p>
         <a:p>
-          <a:pPr marL="285750" lvl="1" indent="-285750" algn="l" defTabSz="1377950">
+          <a:pPr marL="228600" lvl="1" indent="-228600" algn="l" defTabSz="1022350">
             <a:lnSpc>
               <a:spcPct val="90000"/>
             </a:lnSpc>
@@ -8859,12 +9041,12 @@
             <a:buChar char="•"/>
           </a:pPr>
           <a:r>
-            <a:rPr lang="en-GB" sz="3100" kern="1200" dirty="0"/>
+            <a:rPr lang="en-GB" sz="2300" kern="1200" dirty="0"/>
             <a:t>Last Name</a:t>
           </a:r>
         </a:p>
         <a:p>
-          <a:pPr marL="285750" lvl="1" indent="-285750" algn="l" defTabSz="1377950">
+          <a:pPr marL="228600" lvl="1" indent="-228600" algn="l" defTabSz="1022350">
             <a:lnSpc>
               <a:spcPct val="90000"/>
             </a:lnSpc>
@@ -8877,12 +9059,12 @@
             <a:buChar char="•"/>
           </a:pPr>
           <a:r>
-            <a:rPr lang="en-GB" sz="3100" kern="1200" dirty="0"/>
+            <a:rPr lang="en-GB" sz="2300" kern="1200" dirty="0"/>
             <a:t>Email</a:t>
           </a:r>
         </a:p>
         <a:p>
-          <a:pPr marL="285750" lvl="1" indent="-285750" algn="l" defTabSz="1377950">
+          <a:pPr marL="228600" lvl="1" indent="-228600" algn="l" defTabSz="1022350">
             <a:lnSpc>
               <a:spcPct val="90000"/>
             </a:lnSpc>
@@ -8895,12 +9077,12 @@
             <a:buChar char="•"/>
           </a:pPr>
           <a:r>
-            <a:rPr lang="en-GB" sz="3100" kern="1200" dirty="0"/>
+            <a:rPr lang="en-GB" sz="2300" kern="1200" dirty="0"/>
             <a:t>Password</a:t>
           </a:r>
         </a:p>
         <a:p>
-          <a:pPr marL="285750" lvl="1" indent="-285750" algn="l" defTabSz="1377950">
+          <a:pPr marL="228600" lvl="1" indent="-228600" algn="l" defTabSz="1022350">
             <a:lnSpc>
               <a:spcPct val="90000"/>
             </a:lnSpc>
@@ -8913,14 +9095,50 @@
             <a:buChar char="•"/>
           </a:pPr>
           <a:r>
-            <a:rPr lang="en-GB" sz="3100" kern="1200" dirty="0"/>
+            <a:rPr lang="en-GB" sz="2300" kern="1200" dirty="0"/>
             <a:t>Is staff</a:t>
           </a:r>
         </a:p>
+        <a:p>
+          <a:pPr marL="228600" lvl="1" indent="-228600" algn="l" defTabSz="1022350">
+            <a:lnSpc>
+              <a:spcPct val="90000"/>
+            </a:lnSpc>
+            <a:spcBef>
+              <a:spcPct val="0"/>
+            </a:spcBef>
+            <a:spcAft>
+              <a:spcPct val="15000"/>
+            </a:spcAft>
+            <a:buChar char="•"/>
+          </a:pPr>
+          <a:r>
+            <a:rPr lang="en-GB" sz="2300" kern="1200" dirty="0"/>
+            <a:t>Is super admin</a:t>
+          </a:r>
+        </a:p>
+        <a:p>
+          <a:pPr marL="228600" lvl="1" indent="-228600" algn="l" defTabSz="1022350">
+            <a:lnSpc>
+              <a:spcPct val="90000"/>
+            </a:lnSpc>
+            <a:spcBef>
+              <a:spcPct val="0"/>
+            </a:spcBef>
+            <a:spcAft>
+              <a:spcPct val="15000"/>
+            </a:spcAft>
+            <a:buChar char="•"/>
+          </a:pPr>
+          <a:r>
+            <a:rPr lang="en-GB" sz="2300" kern="1200" dirty="0"/>
+            <a:t>Is Active</a:t>
+          </a:r>
+        </a:p>
       </dsp:txBody>
       <dsp:txXfrm>
-        <a:off x="3286" y="904213"/>
-        <a:ext cx="3203971" cy="3435710"/>
+        <a:off x="3286" y="691737"/>
+        <a:ext cx="3203971" cy="3630262"/>
       </dsp:txXfrm>
     </dsp:sp>
     <dsp:sp modelId="{79B70EC0-E56A-44BA-9329-21DDC463B6E8}">
@@ -8930,8 +9148,8 @@
       </dsp:nvSpPr>
       <dsp:spPr>
         <a:xfrm>
-          <a:off x="3655814" y="11413"/>
-          <a:ext cx="3203971" cy="892800"/>
+          <a:off x="3655814" y="29337"/>
+          <a:ext cx="3203971" cy="662400"/>
         </a:xfrm>
         <a:prstGeom prst="rect">
           <a:avLst/>
@@ -8973,12 +9191,12 @@
         </a:fontRef>
       </dsp:style>
       <dsp:txBody>
-        <a:bodyPr spcFirstLastPara="0" vert="horz" wrap="square" lIns="220472" tIns="125984" rIns="220472" bIns="125984" numCol="1" spcCol="1270" anchor="ctr" anchorCtr="0">
+        <a:bodyPr spcFirstLastPara="0" vert="horz" wrap="square" lIns="163576" tIns="93472" rIns="163576" bIns="93472" numCol="1" spcCol="1270" anchor="ctr" anchorCtr="0">
           <a:noAutofit/>
         </a:bodyPr>
         <a:lstStyle/>
         <a:p>
-          <a:pPr marL="0" lvl="0" indent="0" algn="ctr" defTabSz="1377950">
+          <a:pPr marL="0" lvl="0" indent="0" algn="ctr" defTabSz="1022350">
             <a:lnSpc>
               <a:spcPct val="90000"/>
             </a:lnSpc>
@@ -8991,14 +9209,14 @@
             <a:buNone/>
           </a:pPr>
           <a:r>
-            <a:rPr lang="en-GB" sz="3100" kern="1200" dirty="0"/>
+            <a:rPr lang="en-GB" sz="2300" kern="1200" dirty="0"/>
             <a:t>Staff-Teaching</a:t>
           </a:r>
         </a:p>
       </dsp:txBody>
       <dsp:txXfrm>
-        <a:off x="3655814" y="11413"/>
-        <a:ext cx="3203971" cy="892800"/>
+        <a:off x="3655814" y="29337"/>
+        <a:ext cx="3203971" cy="662400"/>
       </dsp:txXfrm>
     </dsp:sp>
     <dsp:sp modelId="{84CFAEEA-BE16-4C92-8ADA-7F14E739DB71}">
@@ -9008,8 +9226,8 @@
       </dsp:nvSpPr>
       <dsp:spPr>
         <a:xfrm>
-          <a:off x="3655814" y="904213"/>
-          <a:ext cx="3203971" cy="3435710"/>
+          <a:off x="3655814" y="691737"/>
+          <a:ext cx="3203971" cy="3630262"/>
         </a:xfrm>
         <a:prstGeom prst="rect">
           <a:avLst/>
@@ -9053,12 +9271,12 @@
         <a:fontRef idx="minor"/>
       </dsp:style>
       <dsp:txBody>
-        <a:bodyPr spcFirstLastPara="0" vert="horz" wrap="square" lIns="165354" tIns="165354" rIns="220472" bIns="248031" numCol="1" spcCol="1270" anchor="t" anchorCtr="0">
+        <a:bodyPr spcFirstLastPara="0" vert="horz" wrap="square" lIns="122682" tIns="122682" rIns="163576" bIns="184023" numCol="1" spcCol="1270" anchor="t" anchorCtr="0">
           <a:noAutofit/>
         </a:bodyPr>
         <a:lstStyle/>
         <a:p>
-          <a:pPr marL="285750" lvl="1" indent="-285750" algn="l" defTabSz="1377950">
+          <a:pPr marL="228600" lvl="1" indent="-228600" algn="l" defTabSz="1022350">
             <a:lnSpc>
               <a:spcPct val="90000"/>
             </a:lnSpc>
@@ -9071,12 +9289,12 @@
             <a:buChar char="•"/>
           </a:pPr>
           <a:r>
-            <a:rPr lang="en-GB" sz="3100" kern="1200" dirty="0"/>
+            <a:rPr lang="en-GB" sz="2300" kern="1200" dirty="0"/>
             <a:t>First Name</a:t>
           </a:r>
         </a:p>
         <a:p>
-          <a:pPr marL="285750" lvl="1" indent="-285750" algn="l" defTabSz="1377950">
+          <a:pPr marL="228600" lvl="1" indent="-228600" algn="l" defTabSz="1022350">
             <a:lnSpc>
               <a:spcPct val="90000"/>
             </a:lnSpc>
@@ -9089,13 +9307,13 @@
             <a:buChar char="•"/>
           </a:pPr>
           <a:r>
-            <a:rPr lang="en-GB" sz="3100" kern="1200"/>
+            <a:rPr lang="en-GB" sz="2300" kern="1200"/>
             <a:t>Last Name</a:t>
           </a:r>
-          <a:endParaRPr lang="en-GB" sz="3100" kern="1200" dirty="0"/>
-        </a:p>
-        <a:p>
-          <a:pPr marL="285750" lvl="1" indent="-285750" algn="l" defTabSz="1377950">
+          <a:endParaRPr lang="en-GB" sz="2300" kern="1200" dirty="0"/>
+        </a:p>
+        <a:p>
+          <a:pPr marL="228600" lvl="1" indent="-228600" algn="l" defTabSz="1022350">
             <a:lnSpc>
               <a:spcPct val="90000"/>
             </a:lnSpc>
@@ -9108,13 +9326,13 @@
             <a:buChar char="•"/>
           </a:pPr>
           <a:r>
-            <a:rPr lang="en-GB" sz="3100" kern="1200"/>
+            <a:rPr lang="en-GB" sz="2300" kern="1200"/>
             <a:t>Email</a:t>
           </a:r>
-          <a:endParaRPr lang="en-GB" sz="3100" kern="1200" dirty="0"/>
-        </a:p>
-        <a:p>
-          <a:pPr marL="285750" lvl="1" indent="-285750" algn="l" defTabSz="1377950">
+          <a:endParaRPr lang="en-GB" sz="2300" kern="1200" dirty="0"/>
+        </a:p>
+        <a:p>
+          <a:pPr marL="228600" lvl="1" indent="-228600" algn="l" defTabSz="1022350">
             <a:lnSpc>
               <a:spcPct val="90000"/>
             </a:lnSpc>
@@ -9127,13 +9345,13 @@
             <a:buChar char="•"/>
           </a:pPr>
           <a:r>
-            <a:rPr lang="en-GB" sz="3100" kern="1200"/>
+            <a:rPr lang="en-GB" sz="2300" kern="1200"/>
             <a:t>Password</a:t>
           </a:r>
-          <a:endParaRPr lang="en-GB" sz="3100" kern="1200" dirty="0"/>
-        </a:p>
-        <a:p>
-          <a:pPr marL="285750" lvl="1" indent="-285750" algn="l" defTabSz="1377950">
+          <a:endParaRPr lang="en-GB" sz="2300" kern="1200" dirty="0"/>
+        </a:p>
+        <a:p>
+          <a:pPr marL="228600" lvl="1" indent="-228600" algn="l" defTabSz="1022350">
             <a:lnSpc>
               <a:spcPct val="90000"/>
             </a:lnSpc>
@@ -9146,13 +9364,13 @@
             <a:buChar char="•"/>
           </a:pPr>
           <a:r>
-            <a:rPr lang="en-GB" sz="3100" kern="1200" dirty="0" err="1"/>
+            <a:rPr lang="en-GB" sz="2300" kern="1200" dirty="0" err="1"/>
             <a:t>Is_academic</a:t>
           </a:r>
-          <a:endParaRPr lang="en-GB" sz="3100" kern="1200" dirty="0"/>
-        </a:p>
-        <a:p>
-          <a:pPr marL="285750" lvl="1" indent="-285750" algn="l" defTabSz="1377950">
+          <a:endParaRPr lang="en-GB" sz="2300" kern="1200" dirty="0"/>
+        </a:p>
+        <a:p>
+          <a:pPr marL="228600" lvl="1" indent="-228600" algn="l" defTabSz="1022350">
             <a:lnSpc>
               <a:spcPct val="90000"/>
             </a:lnSpc>
@@ -9164,12 +9382,15 @@
             </a:spcAft>
             <a:buChar char="•"/>
           </a:pPr>
-          <a:endParaRPr lang="en-GB" sz="3100" kern="1200" dirty="0"/>
+          <a:r>
+            <a:rPr lang="en-GB" sz="2300" kern="1200" dirty="0"/>
+            <a:t>Is active</a:t>
+          </a:r>
         </a:p>
       </dsp:txBody>
       <dsp:txXfrm>
-        <a:off x="3655814" y="904213"/>
-        <a:ext cx="3203971" cy="3435710"/>
+        <a:off x="3655814" y="691737"/>
+        <a:ext cx="3203971" cy="3630262"/>
       </dsp:txXfrm>
     </dsp:sp>
     <dsp:sp modelId="{9AC2F46D-F58D-4EB8-876D-4363C9D71D81}">
@@ -9179,8 +9400,8 @@
       </dsp:nvSpPr>
       <dsp:spPr>
         <a:xfrm>
-          <a:off x="7308342" y="11413"/>
-          <a:ext cx="3203971" cy="892800"/>
+          <a:off x="7308342" y="29337"/>
+          <a:ext cx="3203971" cy="662400"/>
         </a:xfrm>
         <a:prstGeom prst="rect">
           <a:avLst/>
@@ -9222,12 +9443,12 @@
         </a:fontRef>
       </dsp:style>
       <dsp:txBody>
-        <a:bodyPr spcFirstLastPara="0" vert="horz" wrap="square" lIns="220472" tIns="125984" rIns="220472" bIns="125984" numCol="1" spcCol="1270" anchor="ctr" anchorCtr="0">
+        <a:bodyPr spcFirstLastPara="0" vert="horz" wrap="square" lIns="163576" tIns="93472" rIns="163576" bIns="93472" numCol="1" spcCol="1270" anchor="ctr" anchorCtr="0">
           <a:noAutofit/>
         </a:bodyPr>
         <a:lstStyle/>
         <a:p>
-          <a:pPr marL="0" lvl="0" indent="0" algn="ctr" defTabSz="1377950">
+          <a:pPr marL="0" lvl="0" indent="0" algn="ctr" defTabSz="1022350">
             <a:lnSpc>
               <a:spcPct val="90000"/>
             </a:lnSpc>
@@ -9240,14 +9461,14 @@
             <a:buNone/>
           </a:pPr>
           <a:r>
-            <a:rPr lang="en-GB" sz="3100" kern="1200" dirty="0"/>
+            <a:rPr lang="en-GB" sz="2300" kern="1200" dirty="0"/>
             <a:t>Student</a:t>
           </a:r>
         </a:p>
       </dsp:txBody>
       <dsp:txXfrm>
-        <a:off x="7308342" y="11413"/>
-        <a:ext cx="3203971" cy="892800"/>
+        <a:off x="7308342" y="29337"/>
+        <a:ext cx="3203971" cy="662400"/>
       </dsp:txXfrm>
     </dsp:sp>
     <dsp:sp modelId="{5F4973BD-9891-4B7F-858A-40B51A75E58F}">
@@ -9257,8 +9478,8 @@
       </dsp:nvSpPr>
       <dsp:spPr>
         <a:xfrm>
-          <a:off x="7308342" y="904213"/>
-          <a:ext cx="3203971" cy="3435710"/>
+          <a:off x="7308342" y="691737"/>
+          <a:ext cx="3203971" cy="3630262"/>
         </a:xfrm>
         <a:prstGeom prst="rect">
           <a:avLst/>
@@ -9302,12 +9523,12 @@
         <a:fontRef idx="minor"/>
       </dsp:style>
       <dsp:txBody>
-        <a:bodyPr spcFirstLastPara="0" vert="horz" wrap="square" lIns="165354" tIns="165354" rIns="220472" bIns="248031" numCol="1" spcCol="1270" anchor="t" anchorCtr="0">
+        <a:bodyPr spcFirstLastPara="0" vert="horz" wrap="square" lIns="122682" tIns="122682" rIns="163576" bIns="184023" numCol="1" spcCol="1270" anchor="t" anchorCtr="0">
           <a:noAutofit/>
         </a:bodyPr>
         <a:lstStyle/>
         <a:p>
-          <a:pPr marL="285750" lvl="1" indent="-285750" algn="l" defTabSz="1377950">
+          <a:pPr marL="228600" lvl="1" indent="-228600" algn="l" defTabSz="1022350">
             <a:lnSpc>
               <a:spcPct val="90000"/>
             </a:lnSpc>
@@ -9320,12 +9541,12 @@
             <a:buChar char="•"/>
           </a:pPr>
           <a:r>
-            <a:rPr lang="en-GB" sz="3100" kern="1200" dirty="0"/>
+            <a:rPr lang="en-GB" sz="2300" kern="1200" dirty="0"/>
             <a:t>First Name</a:t>
           </a:r>
         </a:p>
         <a:p>
-          <a:pPr marL="285750" lvl="1" indent="-285750" algn="l" defTabSz="1377950">
+          <a:pPr marL="228600" lvl="1" indent="-228600" algn="l" defTabSz="1022350">
             <a:lnSpc>
               <a:spcPct val="90000"/>
             </a:lnSpc>
@@ -9338,13 +9559,13 @@
             <a:buChar char="•"/>
           </a:pPr>
           <a:r>
-            <a:rPr lang="en-GB" sz="3100" kern="1200"/>
+            <a:rPr lang="en-GB" sz="2300" kern="1200"/>
             <a:t>Last Name</a:t>
           </a:r>
-          <a:endParaRPr lang="en-GB" sz="3100" kern="1200" dirty="0"/>
-        </a:p>
-        <a:p>
-          <a:pPr marL="285750" lvl="1" indent="-285750" algn="l" defTabSz="1377950">
+          <a:endParaRPr lang="en-GB" sz="2300" kern="1200" dirty="0"/>
+        </a:p>
+        <a:p>
+          <a:pPr marL="228600" lvl="1" indent="-228600" algn="l" defTabSz="1022350">
             <a:lnSpc>
               <a:spcPct val="90000"/>
             </a:lnSpc>
@@ -9357,13 +9578,13 @@
             <a:buChar char="•"/>
           </a:pPr>
           <a:r>
-            <a:rPr lang="en-GB" sz="3100" kern="1200"/>
+            <a:rPr lang="en-GB" sz="2300" kern="1200"/>
             <a:t>Email</a:t>
           </a:r>
-          <a:endParaRPr lang="en-GB" sz="3100" kern="1200" dirty="0"/>
-        </a:p>
-        <a:p>
-          <a:pPr marL="285750" lvl="1" indent="-285750" algn="l" defTabSz="1377950">
+          <a:endParaRPr lang="en-GB" sz="2300" kern="1200" dirty="0"/>
+        </a:p>
+        <a:p>
+          <a:pPr marL="228600" lvl="1" indent="-228600" algn="l" defTabSz="1022350">
             <a:lnSpc>
               <a:spcPct val="90000"/>
             </a:lnSpc>
@@ -9376,13 +9597,13 @@
             <a:buChar char="•"/>
           </a:pPr>
           <a:r>
-            <a:rPr lang="en-GB" sz="3100" kern="1200"/>
+            <a:rPr lang="en-GB" sz="2300" kern="1200"/>
             <a:t>Password</a:t>
           </a:r>
-          <a:endParaRPr lang="en-GB" sz="3100" kern="1200" dirty="0"/>
-        </a:p>
-        <a:p>
-          <a:pPr marL="285750" lvl="1" indent="-285750" algn="l" defTabSz="1377950">
+          <a:endParaRPr lang="en-GB" sz="2300" kern="1200" dirty="0"/>
+        </a:p>
+        <a:p>
+          <a:pPr marL="228600" lvl="1" indent="-228600" algn="l" defTabSz="1022350">
             <a:lnSpc>
               <a:spcPct val="90000"/>
             </a:lnSpc>
@@ -9395,13 +9616,13 @@
             <a:buChar char="•"/>
           </a:pPr>
           <a:r>
-            <a:rPr lang="en-GB" sz="3100" kern="1200" dirty="0" err="1"/>
+            <a:rPr lang="en-GB" sz="2300" kern="1200" dirty="0" err="1"/>
             <a:t>Is_student</a:t>
           </a:r>
-          <a:endParaRPr lang="en-GB" sz="3100" kern="1200" dirty="0"/>
-        </a:p>
-        <a:p>
-          <a:pPr marL="285750" lvl="1" indent="-285750" algn="l" defTabSz="1377950">
+          <a:endParaRPr lang="en-GB" sz="2300" kern="1200" dirty="0"/>
+        </a:p>
+        <a:p>
+          <a:pPr marL="228600" lvl="1" indent="-228600" algn="l" defTabSz="1022350">
             <a:lnSpc>
               <a:spcPct val="90000"/>
             </a:lnSpc>
@@ -9413,12 +9634,69 @@
             </a:spcAft>
             <a:buChar char="•"/>
           </a:pPr>
-          <a:endParaRPr lang="en-GB" sz="3100" kern="1200" dirty="0"/>
+          <a:r>
+            <a:rPr lang="en-GB" sz="2300" kern="1200" dirty="0"/>
+            <a:t>Is active</a:t>
+          </a:r>
+        </a:p>
+        <a:p>
+          <a:pPr marL="228600" lvl="1" indent="-228600" algn="l" defTabSz="1022350">
+            <a:lnSpc>
+              <a:spcPct val="90000"/>
+            </a:lnSpc>
+            <a:spcBef>
+              <a:spcPct val="0"/>
+            </a:spcBef>
+            <a:spcAft>
+              <a:spcPct val="15000"/>
+            </a:spcAft>
+            <a:buChar char="•"/>
+          </a:pPr>
+          <a:r>
+            <a:rPr lang="en-GB" sz="2300" kern="1200" dirty="0"/>
+            <a:t>Is Enrolled</a:t>
+          </a:r>
+        </a:p>
+        <a:p>
+          <a:pPr marL="228600" lvl="1" indent="-228600" algn="l" defTabSz="1022350">
+            <a:lnSpc>
+              <a:spcPct val="90000"/>
+            </a:lnSpc>
+            <a:spcBef>
+              <a:spcPct val="0"/>
+            </a:spcBef>
+            <a:spcAft>
+              <a:spcPct val="15000"/>
+            </a:spcAft>
+            <a:buChar char="•"/>
+          </a:pPr>
+          <a:r>
+            <a:rPr lang="en-GB" sz="2300" kern="1200" dirty="0"/>
+            <a:t>Is Suspended</a:t>
+          </a:r>
+        </a:p>
+        <a:p>
+          <a:pPr marL="228600" lvl="1" indent="-228600" algn="l" defTabSz="1022350">
+            <a:lnSpc>
+              <a:spcPct val="90000"/>
+            </a:lnSpc>
+            <a:spcBef>
+              <a:spcPct val="0"/>
+            </a:spcBef>
+            <a:spcAft>
+              <a:spcPct val="15000"/>
+            </a:spcAft>
+            <a:buChar char="•"/>
+          </a:pPr>
+          <a:r>
+            <a:rPr lang="en-GB" sz="2300" kern="1200" dirty="0"/>
+            <a:t>Is Stand By</a:t>
+          </a:r>
         </a:p>
       </dsp:txBody>
       <dsp:txXfrm>
-        <a:off x="7308342" y="904213"/>
-        <a:ext cx="3203971" cy="3435710"/>
+        <a:off x="7308342" y="691737"/>
+        <a:ext cx="3203971" cy="3630262"/>
       </dsp:txXfrm>
     </dsp:sp>
   </dsp:spTree>
@@ -16541,7 +16819,7 @@
           <a:p>
             <a:fld id="{22C015C7-6CA6-40D8-BCB4-2B26807C9380}" type="datetimeFigureOut">
               <a:rPr lang="en-GB" smtClean="0"/>
-              <a:t>20/03/2022</a:t>
+              <a:t>21/03/2022</a:t>
             </a:fld>
             <a:endParaRPr lang="en-GB"/>
           </a:p>
@@ -16741,7 +17019,7 @@
           <a:p>
             <a:fld id="{22C015C7-6CA6-40D8-BCB4-2B26807C9380}" type="datetimeFigureOut">
               <a:rPr lang="en-GB" smtClean="0"/>
-              <a:t>20/03/2022</a:t>
+              <a:t>21/03/2022</a:t>
             </a:fld>
             <a:endParaRPr lang="en-GB"/>
           </a:p>
@@ -16951,7 +17229,7 @@
           <a:p>
             <a:fld id="{22C015C7-6CA6-40D8-BCB4-2B26807C9380}" type="datetimeFigureOut">
               <a:rPr lang="en-GB" smtClean="0"/>
-              <a:t>20/03/2022</a:t>
+              <a:t>21/03/2022</a:t>
             </a:fld>
             <a:endParaRPr lang="en-GB"/>
           </a:p>
@@ -17151,7 +17429,7 @@
           <a:p>
             <a:fld id="{22C015C7-6CA6-40D8-BCB4-2B26807C9380}" type="datetimeFigureOut">
               <a:rPr lang="en-GB" smtClean="0"/>
-              <a:t>20/03/2022</a:t>
+              <a:t>21/03/2022</a:t>
             </a:fld>
             <a:endParaRPr lang="en-GB"/>
           </a:p>
@@ -17427,7 +17705,7 @@
           <a:p>
             <a:fld id="{22C015C7-6CA6-40D8-BCB4-2B26807C9380}" type="datetimeFigureOut">
               <a:rPr lang="en-GB" smtClean="0"/>
-              <a:t>20/03/2022</a:t>
+              <a:t>21/03/2022</a:t>
             </a:fld>
             <a:endParaRPr lang="en-GB"/>
           </a:p>
@@ -17695,7 +17973,7 @@
           <a:p>
             <a:fld id="{22C015C7-6CA6-40D8-BCB4-2B26807C9380}" type="datetimeFigureOut">
               <a:rPr lang="en-GB" smtClean="0"/>
-              <a:t>20/03/2022</a:t>
+              <a:t>21/03/2022</a:t>
             </a:fld>
             <a:endParaRPr lang="en-GB"/>
           </a:p>
@@ -18110,7 +18388,7 @@
           <a:p>
             <a:fld id="{22C015C7-6CA6-40D8-BCB4-2B26807C9380}" type="datetimeFigureOut">
               <a:rPr lang="en-GB" smtClean="0"/>
-              <a:t>20/03/2022</a:t>
+              <a:t>21/03/2022</a:t>
             </a:fld>
             <a:endParaRPr lang="en-GB"/>
           </a:p>
@@ -18252,7 +18530,7 @@
           <a:p>
             <a:fld id="{22C015C7-6CA6-40D8-BCB4-2B26807C9380}" type="datetimeFigureOut">
               <a:rPr lang="en-GB" smtClean="0"/>
-              <a:t>20/03/2022</a:t>
+              <a:t>21/03/2022</a:t>
             </a:fld>
             <a:endParaRPr lang="en-GB"/>
           </a:p>
@@ -18365,7 +18643,7 @@
           <a:p>
             <a:fld id="{22C015C7-6CA6-40D8-BCB4-2B26807C9380}" type="datetimeFigureOut">
               <a:rPr lang="en-GB" smtClean="0"/>
-              <a:t>20/03/2022</a:t>
+              <a:t>21/03/2022</a:t>
             </a:fld>
             <a:endParaRPr lang="en-GB"/>
           </a:p>
@@ -18678,7 +18956,7 @@
           <a:p>
             <a:fld id="{22C015C7-6CA6-40D8-BCB4-2B26807C9380}" type="datetimeFigureOut">
               <a:rPr lang="en-GB" smtClean="0"/>
-              <a:t>20/03/2022</a:t>
+              <a:t>21/03/2022</a:t>
             </a:fld>
             <a:endParaRPr lang="en-GB"/>
           </a:p>
@@ -18967,7 +19245,7 @@
           <a:p>
             <a:fld id="{22C015C7-6CA6-40D8-BCB4-2B26807C9380}" type="datetimeFigureOut">
               <a:rPr lang="en-GB" smtClean="0"/>
-              <a:t>20/03/2022</a:t>
+              <a:t>21/03/2022</a:t>
             </a:fld>
             <a:endParaRPr lang="en-GB"/>
           </a:p>
@@ -19210,7 +19488,7 @@
           <a:p>
             <a:fld id="{22C015C7-6CA6-40D8-BCB4-2B26807C9380}" type="datetimeFigureOut">
               <a:rPr lang="en-GB" smtClean="0"/>
-              <a:t>20/03/2022</a:t>
+              <a:t>21/03/2022</a:t>
             </a:fld>
             <a:endParaRPr lang="en-GB"/>
           </a:p>
@@ -19996,7 +20274,7 @@
             <p:ph idx="1"/>
             <p:extLst>
               <p:ext uri="{D42A27DB-BD31-4B8C-83A1-F6EECF244321}">
-                <p14:modId xmlns:p14="http://schemas.microsoft.com/office/powerpoint/2010/main" val="1695092340"/>
+                <p14:modId xmlns:p14="http://schemas.microsoft.com/office/powerpoint/2010/main" val="3232545220"/>
               </p:ext>
             </p:extLst>
           </p:nvPr>

</xml_diff>